<commit_message>
project report and sketch update
</commit_message>
<xml_diff>
--- a/sketch/Sketch.pptx
+++ b/sketch/Sketch.pptx
@@ -4,9 +4,15 @@
   <p:sldMasterIdLst>
     <p:sldMasterId id="2147483648" r:id="rId1"/>
   </p:sldMasterIdLst>
+  <p:notesMasterIdLst>
+    <p:notesMasterId r:id="rId7"/>
+  </p:notesMasterIdLst>
   <p:sldIdLst>
     <p:sldId id="256" r:id="rId2"/>
     <p:sldId id="257" r:id="rId3"/>
+    <p:sldId id="258" r:id="rId4"/>
+    <p:sldId id="259" r:id="rId5"/>
+    <p:sldId id="260" r:id="rId6"/>
   </p:sldIdLst>
   <p:sldSz cx="12192000" cy="6858000"/>
   <p:notesSz cx="6858000" cy="9144000"/>
@@ -112,10 +118,14 @@
           <p14:sldIdLst>
             <p14:sldId id="256"/>
             <p14:sldId id="257"/>
+            <p14:sldId id="258"/>
+            <p14:sldId id="259"/>
           </p14:sldIdLst>
         </p14:section>
         <p14:section name="Report Sketches" id="{721E4A37-1560-6E40-986D-BC540B8153ED}">
-          <p14:sldIdLst/>
+          <p14:sldIdLst>
+            <p14:sldId id="260"/>
+          </p14:sldIdLst>
         </p14:section>
       </p14:sectionLst>
     </p:ext>
@@ -124,6 +134,439 @@
     </p:ext>
   </p:extLst>
 </p:presentation>
+</file>
+
+<file path=ppt/notesMasters/notesMaster1.xml><?xml version="1.0" encoding="utf-8"?>
+<p:notesMaster xmlns:a="http://schemas.openxmlformats.org/drawingml/2006/main" xmlns:r="http://schemas.openxmlformats.org/officeDocument/2006/relationships" xmlns:p="http://schemas.openxmlformats.org/presentationml/2006/main">
+  <p:cSld>
+    <p:bg>
+      <p:bgRef idx="1001">
+        <a:schemeClr val="bg1"/>
+      </p:bgRef>
+    </p:bg>
+    <p:spTree>
+      <p:nvGrpSpPr>
+        <p:cNvPr id="1" name=""/>
+        <p:cNvGrpSpPr/>
+        <p:nvPr/>
+      </p:nvGrpSpPr>
+      <p:grpSpPr>
+        <a:xfrm>
+          <a:off x="0" y="0"/>
+          <a:ext cx="0" cy="0"/>
+          <a:chOff x="0" y="0"/>
+          <a:chExt cx="0" cy="0"/>
+        </a:xfrm>
+      </p:grpSpPr>
+      <p:sp>
+        <p:nvSpPr>
+          <p:cNvPr id="2" name="Header Placeholder 1"/>
+          <p:cNvSpPr>
+            <a:spLocks noGrp="1"/>
+          </p:cNvSpPr>
+          <p:nvPr>
+            <p:ph type="hdr" sz="quarter"/>
+          </p:nvPr>
+        </p:nvSpPr>
+        <p:spPr>
+          <a:xfrm>
+            <a:off x="0" y="0"/>
+            <a:ext cx="2971800" cy="458788"/>
+          </a:xfrm>
+          <a:prstGeom prst="rect">
+            <a:avLst/>
+          </a:prstGeom>
+        </p:spPr>
+        <p:txBody>
+          <a:bodyPr vert="horz" lIns="91440" tIns="45720" rIns="91440" bIns="45720" rtlCol="0"/>
+          <a:lstStyle>
+            <a:lvl1pPr algn="l">
+              <a:defRPr sz="1200"/>
+            </a:lvl1pPr>
+          </a:lstStyle>
+          <a:p>
+            <a:endParaRPr lang="en-GB"/>
+          </a:p>
+        </p:txBody>
+      </p:sp>
+      <p:sp>
+        <p:nvSpPr>
+          <p:cNvPr id="3" name="Date Placeholder 2"/>
+          <p:cNvSpPr>
+            <a:spLocks noGrp="1"/>
+          </p:cNvSpPr>
+          <p:nvPr>
+            <p:ph type="dt" idx="1"/>
+          </p:nvPr>
+        </p:nvSpPr>
+        <p:spPr>
+          <a:xfrm>
+            <a:off x="3884613" y="0"/>
+            <a:ext cx="2971800" cy="458788"/>
+          </a:xfrm>
+          <a:prstGeom prst="rect">
+            <a:avLst/>
+          </a:prstGeom>
+        </p:spPr>
+        <p:txBody>
+          <a:bodyPr vert="horz" lIns="91440" tIns="45720" rIns="91440" bIns="45720" rtlCol="0"/>
+          <a:lstStyle>
+            <a:lvl1pPr algn="r">
+              <a:defRPr sz="1200"/>
+            </a:lvl1pPr>
+          </a:lstStyle>
+          <a:p>
+            <a:fld id="{5470FFE9-BA39-7D4F-9FAB-1D0BBF9503AD}" type="datetimeFigureOut">
+              <a:rPr lang="en-GB" smtClean="0"/>
+              <a:t>13/11/2022</a:t>
+            </a:fld>
+            <a:endParaRPr lang="en-GB"/>
+          </a:p>
+        </p:txBody>
+      </p:sp>
+      <p:sp>
+        <p:nvSpPr>
+          <p:cNvPr id="4" name="Slide Image Placeholder 3"/>
+          <p:cNvSpPr>
+            <a:spLocks noGrp="1" noRot="1" noChangeAspect="1"/>
+          </p:cNvSpPr>
+          <p:nvPr>
+            <p:ph type="sldImg" idx="2"/>
+          </p:nvPr>
+        </p:nvSpPr>
+        <p:spPr>
+          <a:xfrm>
+            <a:off x="685800" y="1143000"/>
+            <a:ext cx="5486400" cy="3086100"/>
+          </a:xfrm>
+          <a:prstGeom prst="rect">
+            <a:avLst/>
+          </a:prstGeom>
+          <a:noFill/>
+          <a:ln w="12700">
+            <a:solidFill>
+              <a:prstClr val="black"/>
+            </a:solidFill>
+          </a:ln>
+        </p:spPr>
+        <p:txBody>
+          <a:bodyPr vert="horz" lIns="91440" tIns="45720" rIns="91440" bIns="45720" rtlCol="0" anchor="ctr"/>
+          <a:lstStyle/>
+          <a:p>
+            <a:endParaRPr lang="en-GB"/>
+          </a:p>
+        </p:txBody>
+      </p:sp>
+      <p:sp>
+        <p:nvSpPr>
+          <p:cNvPr id="5" name="Notes Placeholder 4"/>
+          <p:cNvSpPr>
+            <a:spLocks noGrp="1"/>
+          </p:cNvSpPr>
+          <p:nvPr>
+            <p:ph type="body" sz="quarter" idx="3"/>
+          </p:nvPr>
+        </p:nvSpPr>
+        <p:spPr>
+          <a:xfrm>
+            <a:off x="685800" y="4400550"/>
+            <a:ext cx="5486400" cy="3600450"/>
+          </a:xfrm>
+          <a:prstGeom prst="rect">
+            <a:avLst/>
+          </a:prstGeom>
+        </p:spPr>
+        <p:txBody>
+          <a:bodyPr vert="horz" lIns="91440" tIns="45720" rIns="91440" bIns="45720" rtlCol="0"/>
+          <a:lstStyle/>
+          <a:p>
+            <a:pPr lvl="0"/>
+            <a:r>
+              <a:rPr lang="en-GB"/>
+              <a:t>Click to edit Master text styles</a:t>
+            </a:r>
+          </a:p>
+          <a:p>
+            <a:pPr lvl="1"/>
+            <a:r>
+              <a:rPr lang="en-GB"/>
+              <a:t>Second level</a:t>
+            </a:r>
+          </a:p>
+          <a:p>
+            <a:pPr lvl="2"/>
+            <a:r>
+              <a:rPr lang="en-GB"/>
+              <a:t>Third level</a:t>
+            </a:r>
+          </a:p>
+          <a:p>
+            <a:pPr lvl="3"/>
+            <a:r>
+              <a:rPr lang="en-GB"/>
+              <a:t>Fourth level</a:t>
+            </a:r>
+          </a:p>
+          <a:p>
+            <a:pPr lvl="4"/>
+            <a:r>
+              <a:rPr lang="en-GB"/>
+              <a:t>Fifth level</a:t>
+            </a:r>
+          </a:p>
+        </p:txBody>
+      </p:sp>
+      <p:sp>
+        <p:nvSpPr>
+          <p:cNvPr id="6" name="Footer Placeholder 5"/>
+          <p:cNvSpPr>
+            <a:spLocks noGrp="1"/>
+          </p:cNvSpPr>
+          <p:nvPr>
+            <p:ph type="ftr" sz="quarter" idx="4"/>
+          </p:nvPr>
+        </p:nvSpPr>
+        <p:spPr>
+          <a:xfrm>
+            <a:off x="0" y="8685213"/>
+            <a:ext cx="2971800" cy="458787"/>
+          </a:xfrm>
+          <a:prstGeom prst="rect">
+            <a:avLst/>
+          </a:prstGeom>
+        </p:spPr>
+        <p:txBody>
+          <a:bodyPr vert="horz" lIns="91440" tIns="45720" rIns="91440" bIns="45720" rtlCol="0" anchor="b"/>
+          <a:lstStyle>
+            <a:lvl1pPr algn="l">
+              <a:defRPr sz="1200"/>
+            </a:lvl1pPr>
+          </a:lstStyle>
+          <a:p>
+            <a:endParaRPr lang="en-GB"/>
+          </a:p>
+        </p:txBody>
+      </p:sp>
+      <p:sp>
+        <p:nvSpPr>
+          <p:cNvPr id="7" name="Slide Number Placeholder 6"/>
+          <p:cNvSpPr>
+            <a:spLocks noGrp="1"/>
+          </p:cNvSpPr>
+          <p:nvPr>
+            <p:ph type="sldNum" sz="quarter" idx="5"/>
+          </p:nvPr>
+        </p:nvSpPr>
+        <p:spPr>
+          <a:xfrm>
+            <a:off x="3884613" y="8685213"/>
+            <a:ext cx="2971800" cy="458787"/>
+          </a:xfrm>
+          <a:prstGeom prst="rect">
+            <a:avLst/>
+          </a:prstGeom>
+        </p:spPr>
+        <p:txBody>
+          <a:bodyPr vert="horz" lIns="91440" tIns="45720" rIns="91440" bIns="45720" rtlCol="0" anchor="b"/>
+          <a:lstStyle>
+            <a:lvl1pPr algn="r">
+              <a:defRPr sz="1200"/>
+            </a:lvl1pPr>
+          </a:lstStyle>
+          <a:p>
+            <a:fld id="{BEE0312D-7504-534A-A660-A2956471EB59}" type="slidenum">
+              <a:rPr lang="en-GB" smtClean="0"/>
+              <a:t>‹#›</a:t>
+            </a:fld>
+            <a:endParaRPr lang="en-GB"/>
+          </a:p>
+        </p:txBody>
+      </p:sp>
+    </p:spTree>
+    <p:extLst>
+      <p:ext uri="{BB962C8B-B14F-4D97-AF65-F5344CB8AC3E}">
+        <p14:creationId xmlns:p14="http://schemas.microsoft.com/office/powerpoint/2010/main" val="1439569587"/>
+      </p:ext>
+    </p:extLst>
+  </p:cSld>
+  <p:clrMap bg1="lt1" tx1="dk1" bg2="lt2" tx2="dk2" accent1="accent1" accent2="accent2" accent3="accent3" accent4="accent4" accent5="accent5" accent6="accent6" hlink="hlink" folHlink="folHlink"/>
+  <p:notesStyle>
+    <a:lvl1pPr marL="0" algn="l" defTabSz="914400" rtl="0" eaLnBrk="1" latinLnBrk="0" hangingPunct="1">
+      <a:defRPr sz="1200" kern="1200">
+        <a:solidFill>
+          <a:schemeClr val="tx1"/>
+        </a:solidFill>
+        <a:latin typeface="+mn-lt"/>
+        <a:ea typeface="+mn-ea"/>
+        <a:cs typeface="+mn-cs"/>
+      </a:defRPr>
+    </a:lvl1pPr>
+    <a:lvl2pPr marL="457200" algn="l" defTabSz="914400" rtl="0" eaLnBrk="1" latinLnBrk="0" hangingPunct="1">
+      <a:defRPr sz="1200" kern="1200">
+        <a:solidFill>
+          <a:schemeClr val="tx1"/>
+        </a:solidFill>
+        <a:latin typeface="+mn-lt"/>
+        <a:ea typeface="+mn-ea"/>
+        <a:cs typeface="+mn-cs"/>
+      </a:defRPr>
+    </a:lvl2pPr>
+    <a:lvl3pPr marL="914400" algn="l" defTabSz="914400" rtl="0" eaLnBrk="1" latinLnBrk="0" hangingPunct="1">
+      <a:defRPr sz="1200" kern="1200">
+        <a:solidFill>
+          <a:schemeClr val="tx1"/>
+        </a:solidFill>
+        <a:latin typeface="+mn-lt"/>
+        <a:ea typeface="+mn-ea"/>
+        <a:cs typeface="+mn-cs"/>
+      </a:defRPr>
+    </a:lvl3pPr>
+    <a:lvl4pPr marL="1371600" algn="l" defTabSz="914400" rtl="0" eaLnBrk="1" latinLnBrk="0" hangingPunct="1">
+      <a:defRPr sz="1200" kern="1200">
+        <a:solidFill>
+          <a:schemeClr val="tx1"/>
+        </a:solidFill>
+        <a:latin typeface="+mn-lt"/>
+        <a:ea typeface="+mn-ea"/>
+        <a:cs typeface="+mn-cs"/>
+      </a:defRPr>
+    </a:lvl4pPr>
+    <a:lvl5pPr marL="1828800" algn="l" defTabSz="914400" rtl="0" eaLnBrk="1" latinLnBrk="0" hangingPunct="1">
+      <a:defRPr sz="1200" kern="1200">
+        <a:solidFill>
+          <a:schemeClr val="tx1"/>
+        </a:solidFill>
+        <a:latin typeface="+mn-lt"/>
+        <a:ea typeface="+mn-ea"/>
+        <a:cs typeface="+mn-cs"/>
+      </a:defRPr>
+    </a:lvl5pPr>
+    <a:lvl6pPr marL="2286000" algn="l" defTabSz="914400" rtl="0" eaLnBrk="1" latinLnBrk="0" hangingPunct="1">
+      <a:defRPr sz="1200" kern="1200">
+        <a:solidFill>
+          <a:schemeClr val="tx1"/>
+        </a:solidFill>
+        <a:latin typeface="+mn-lt"/>
+        <a:ea typeface="+mn-ea"/>
+        <a:cs typeface="+mn-cs"/>
+      </a:defRPr>
+    </a:lvl6pPr>
+    <a:lvl7pPr marL="2743200" algn="l" defTabSz="914400" rtl="0" eaLnBrk="1" latinLnBrk="0" hangingPunct="1">
+      <a:defRPr sz="1200" kern="1200">
+        <a:solidFill>
+          <a:schemeClr val="tx1"/>
+        </a:solidFill>
+        <a:latin typeface="+mn-lt"/>
+        <a:ea typeface="+mn-ea"/>
+        <a:cs typeface="+mn-cs"/>
+      </a:defRPr>
+    </a:lvl7pPr>
+    <a:lvl8pPr marL="3200400" algn="l" defTabSz="914400" rtl="0" eaLnBrk="1" latinLnBrk="0" hangingPunct="1">
+      <a:defRPr sz="1200" kern="1200">
+        <a:solidFill>
+          <a:schemeClr val="tx1"/>
+        </a:solidFill>
+        <a:latin typeface="+mn-lt"/>
+        <a:ea typeface="+mn-ea"/>
+        <a:cs typeface="+mn-cs"/>
+      </a:defRPr>
+    </a:lvl8pPr>
+    <a:lvl9pPr marL="3657600" algn="l" defTabSz="914400" rtl="0" eaLnBrk="1" latinLnBrk="0" hangingPunct="1">
+      <a:defRPr sz="1200" kern="1200">
+        <a:solidFill>
+          <a:schemeClr val="tx1"/>
+        </a:solidFill>
+        <a:latin typeface="+mn-lt"/>
+        <a:ea typeface="+mn-ea"/>
+        <a:cs typeface="+mn-cs"/>
+      </a:defRPr>
+    </a:lvl9pPr>
+  </p:notesStyle>
+</p:notesMaster>
+</file>
+
+<file path=ppt/notesSlides/notesSlide1.xml><?xml version="1.0" encoding="utf-8"?>
+<p:notes xmlns:a="http://schemas.openxmlformats.org/drawingml/2006/main" xmlns:r="http://schemas.openxmlformats.org/officeDocument/2006/relationships" xmlns:p="http://schemas.openxmlformats.org/presentationml/2006/main">
+  <p:cSld>
+    <p:spTree>
+      <p:nvGrpSpPr>
+        <p:cNvPr id="1" name=""/>
+        <p:cNvGrpSpPr/>
+        <p:nvPr/>
+      </p:nvGrpSpPr>
+      <p:grpSpPr>
+        <a:xfrm>
+          <a:off x="0" y="0"/>
+          <a:ext cx="0" cy="0"/>
+          <a:chOff x="0" y="0"/>
+          <a:chExt cx="0" cy="0"/>
+        </a:xfrm>
+      </p:grpSpPr>
+      <p:sp>
+        <p:nvSpPr>
+          <p:cNvPr id="2" name="Slide Image Placeholder 1"/>
+          <p:cNvSpPr>
+            <a:spLocks noGrp="1" noRot="1" noChangeAspect="1"/>
+          </p:cNvSpPr>
+          <p:nvPr>
+            <p:ph type="sldImg"/>
+          </p:nvPr>
+        </p:nvSpPr>
+        <p:spPr/>
+      </p:sp>
+      <p:sp>
+        <p:nvSpPr>
+          <p:cNvPr id="3" name="Notes Placeholder 2"/>
+          <p:cNvSpPr>
+            <a:spLocks noGrp="1"/>
+          </p:cNvSpPr>
+          <p:nvPr>
+            <p:ph type="body" idx="1"/>
+          </p:nvPr>
+        </p:nvSpPr>
+        <p:spPr/>
+        <p:txBody>
+          <a:bodyPr/>
+          <a:lstStyle/>
+          <a:p>
+            <a:endParaRPr lang="en-GB" dirty="0"/>
+          </a:p>
+        </p:txBody>
+      </p:sp>
+      <p:sp>
+        <p:nvSpPr>
+          <p:cNvPr id="4" name="Slide Number Placeholder 3"/>
+          <p:cNvSpPr>
+            <a:spLocks noGrp="1"/>
+          </p:cNvSpPr>
+          <p:nvPr>
+            <p:ph type="sldNum" sz="quarter" idx="5"/>
+          </p:nvPr>
+        </p:nvSpPr>
+        <p:spPr/>
+        <p:txBody>
+          <a:bodyPr/>
+          <a:lstStyle/>
+          <a:p>
+            <a:fld id="{BEE0312D-7504-534A-A660-A2956471EB59}" type="slidenum">
+              <a:rPr lang="en-GB" smtClean="0"/>
+              <a:t>5</a:t>
+            </a:fld>
+            <a:endParaRPr lang="en-GB"/>
+          </a:p>
+        </p:txBody>
+      </p:sp>
+    </p:spTree>
+    <p:extLst>
+      <p:ext uri="{BB962C8B-B14F-4D97-AF65-F5344CB8AC3E}">
+        <p14:creationId xmlns:p14="http://schemas.microsoft.com/office/powerpoint/2010/main" val="1663866244"/>
+      </p:ext>
+    </p:extLst>
+  </p:cSld>
+  <p:clrMapOvr>
+    <a:masterClrMapping/>
+  </p:clrMapOvr>
+</p:notes>
 </file>
 
 <file path=ppt/slideLayouts/slideLayout1.xml><?xml version="1.0" encoding="utf-8"?>
@@ -273,7 +716,7 @@
           <a:p>
             <a:fld id="{DFC86FF5-A993-5E46-9D0C-47E0F533B519}" type="datetimeFigureOut">
               <a:rPr lang="en-GB" smtClean="0"/>
-              <a:t>06/11/2022</a:t>
+              <a:t>13/11/2022</a:t>
             </a:fld>
             <a:endParaRPr lang="en-GB"/>
           </a:p>
@@ -471,7 +914,7 @@
           <a:p>
             <a:fld id="{DFC86FF5-A993-5E46-9D0C-47E0F533B519}" type="datetimeFigureOut">
               <a:rPr lang="en-GB" smtClean="0"/>
-              <a:t>06/11/2022</a:t>
+              <a:t>13/11/2022</a:t>
             </a:fld>
             <a:endParaRPr lang="en-GB"/>
           </a:p>
@@ -679,7 +1122,7 @@
           <a:p>
             <a:fld id="{DFC86FF5-A993-5E46-9D0C-47E0F533B519}" type="datetimeFigureOut">
               <a:rPr lang="en-GB" smtClean="0"/>
-              <a:t>06/11/2022</a:t>
+              <a:t>13/11/2022</a:t>
             </a:fld>
             <a:endParaRPr lang="en-GB"/>
           </a:p>
@@ -877,7 +1320,7 @@
           <a:p>
             <a:fld id="{DFC86FF5-A993-5E46-9D0C-47E0F533B519}" type="datetimeFigureOut">
               <a:rPr lang="en-GB" smtClean="0"/>
-              <a:t>06/11/2022</a:t>
+              <a:t>13/11/2022</a:t>
             </a:fld>
             <a:endParaRPr lang="en-GB"/>
           </a:p>
@@ -1152,7 +1595,7 @@
           <a:p>
             <a:fld id="{DFC86FF5-A993-5E46-9D0C-47E0F533B519}" type="datetimeFigureOut">
               <a:rPr lang="en-GB" smtClean="0"/>
-              <a:t>06/11/2022</a:t>
+              <a:t>13/11/2022</a:t>
             </a:fld>
             <a:endParaRPr lang="en-GB"/>
           </a:p>
@@ -1417,7 +1860,7 @@
           <a:p>
             <a:fld id="{DFC86FF5-A993-5E46-9D0C-47E0F533B519}" type="datetimeFigureOut">
               <a:rPr lang="en-GB" smtClean="0"/>
-              <a:t>06/11/2022</a:t>
+              <a:t>13/11/2022</a:t>
             </a:fld>
             <a:endParaRPr lang="en-GB"/>
           </a:p>
@@ -1829,7 +2272,7 @@
           <a:p>
             <a:fld id="{DFC86FF5-A993-5E46-9D0C-47E0F533B519}" type="datetimeFigureOut">
               <a:rPr lang="en-GB" smtClean="0"/>
-              <a:t>06/11/2022</a:t>
+              <a:t>13/11/2022</a:t>
             </a:fld>
             <a:endParaRPr lang="en-GB"/>
           </a:p>
@@ -1970,7 +2413,7 @@
           <a:p>
             <a:fld id="{DFC86FF5-A993-5E46-9D0C-47E0F533B519}" type="datetimeFigureOut">
               <a:rPr lang="en-GB" smtClean="0"/>
-              <a:t>06/11/2022</a:t>
+              <a:t>13/11/2022</a:t>
             </a:fld>
             <a:endParaRPr lang="en-GB"/>
           </a:p>
@@ -2083,7 +2526,7 @@
           <a:p>
             <a:fld id="{DFC86FF5-A993-5E46-9D0C-47E0F533B519}" type="datetimeFigureOut">
               <a:rPr lang="en-GB" smtClean="0"/>
-              <a:t>06/11/2022</a:t>
+              <a:t>13/11/2022</a:t>
             </a:fld>
             <a:endParaRPr lang="en-GB"/>
           </a:p>
@@ -2394,7 +2837,7 @@
           <a:p>
             <a:fld id="{DFC86FF5-A993-5E46-9D0C-47E0F533B519}" type="datetimeFigureOut">
               <a:rPr lang="en-GB" smtClean="0"/>
-              <a:t>06/11/2022</a:t>
+              <a:t>13/11/2022</a:t>
             </a:fld>
             <a:endParaRPr lang="en-GB"/>
           </a:p>
@@ -2682,7 +3125,7 @@
           <a:p>
             <a:fld id="{DFC86FF5-A993-5E46-9D0C-47E0F533B519}" type="datetimeFigureOut">
               <a:rPr lang="en-GB" smtClean="0"/>
-              <a:t>06/11/2022</a:t>
+              <a:t>13/11/2022</a:t>
             </a:fld>
             <a:endParaRPr lang="en-GB"/>
           </a:p>
@@ -2923,7 +3366,7 @@
           <a:p>
             <a:fld id="{DFC86FF5-A993-5E46-9D0C-47E0F533B519}" type="datetimeFigureOut">
               <a:rPr lang="en-GB" smtClean="0"/>
-              <a:t>06/11/2022</a:t>
+              <a:t>13/11/2022</a:t>
             </a:fld>
             <a:endParaRPr lang="en-GB"/>
           </a:p>
@@ -3453,60 +3896,1247 @@
           <a:chExt cx="0" cy="0"/>
         </a:xfrm>
       </p:grpSpPr>
-      <p:sp>
-        <p:nvSpPr>
-          <p:cNvPr id="2" name="Title 1">
-            <a:extLst>
-              <a:ext uri="{FF2B5EF4-FFF2-40B4-BE49-F238E27FC236}">
-                <a16:creationId xmlns:a16="http://schemas.microsoft.com/office/drawing/2014/main" id="{3C116D40-88CB-F145-FF6D-9E25B824C840}"/>
-              </a:ext>
-            </a:extLst>
-          </p:cNvPr>
-          <p:cNvSpPr>
-            <a:spLocks noGrp="1"/>
-          </p:cNvSpPr>
-          <p:nvPr>
-            <p:ph type="title"/>
-          </p:nvPr>
-        </p:nvSpPr>
-        <p:spPr/>
-        <p:txBody>
-          <a:bodyPr/>
-          <a:lstStyle/>
-          <a:p>
-            <a:endParaRPr lang="en-GB"/>
-          </a:p>
-        </p:txBody>
-      </p:sp>
-      <p:sp>
-        <p:nvSpPr>
-          <p:cNvPr id="3" name="Content Placeholder 2">
-            <a:extLst>
-              <a:ext uri="{FF2B5EF4-FFF2-40B4-BE49-F238E27FC236}">
-                <a16:creationId xmlns:a16="http://schemas.microsoft.com/office/drawing/2014/main" id="{B4F9B82A-DE01-45CA-F57F-A21F48AE0413}"/>
-              </a:ext>
-            </a:extLst>
-          </p:cNvPr>
-          <p:cNvSpPr>
-            <a:spLocks noGrp="1"/>
-          </p:cNvSpPr>
-          <p:nvPr>
-            <p:ph idx="1"/>
-          </p:nvPr>
-        </p:nvSpPr>
-        <p:spPr/>
-        <p:txBody>
-          <a:bodyPr/>
-          <a:lstStyle/>
-          <a:p>
-            <a:endParaRPr lang="en-GB"/>
-          </a:p>
-        </p:txBody>
-      </p:sp>
+      <p:pic>
+        <p:nvPicPr>
+          <p:cNvPr id="1026" name="Picture 2" descr="A Simple Explanation of the Machine Learning Workflow | by Andreas Kretz |  Plumbers Of Data Science | Medium">
+            <a:extLst>
+              <a:ext uri="{FF2B5EF4-FFF2-40B4-BE49-F238E27FC236}">
+                <a16:creationId xmlns:a16="http://schemas.microsoft.com/office/drawing/2014/main" id="{5FB917C4-E7EE-DA5E-4DD8-120CF5E5865E}"/>
+              </a:ext>
+            </a:extLst>
+          </p:cNvPr>
+          <p:cNvPicPr>
+            <a:picLocks noChangeAspect="1" noChangeArrowheads="1"/>
+          </p:cNvPicPr>
+          <p:nvPr/>
+        </p:nvPicPr>
+        <p:blipFill>
+          <a:blip r:embed="rId2">
+            <a:extLst>
+              <a:ext uri="{28A0092B-C50C-407E-A947-70E740481C1C}">
+                <a14:useLocalDpi xmlns:a14="http://schemas.microsoft.com/office/drawing/2010/main" val="0"/>
+              </a:ext>
+            </a:extLst>
+          </a:blip>
+          <a:srcRect/>
+          <a:stretch>
+            <a:fillRect/>
+          </a:stretch>
+        </p:blipFill>
+        <p:spPr bwMode="auto">
+          <a:xfrm>
+            <a:off x="1129862" y="635547"/>
+            <a:ext cx="9932276" cy="5586905"/>
+          </a:xfrm>
+          <a:prstGeom prst="rect">
+            <a:avLst/>
+          </a:prstGeom>
+          <a:noFill/>
+          <a:extLst>
+            <a:ext uri="{909E8E84-426E-40DD-AFC4-6F175D3DCCD1}">
+              <a14:hiddenFill xmlns:a14="http://schemas.microsoft.com/office/drawing/2010/main">
+                <a:solidFill>
+                  <a:srgbClr val="FFFFFF"/>
+                </a:solidFill>
+              </a14:hiddenFill>
+            </a:ext>
+          </a:extLst>
+        </p:spPr>
+      </p:pic>
     </p:spTree>
     <p:extLst>
       <p:ext uri="{BB962C8B-B14F-4D97-AF65-F5344CB8AC3E}">
         <p14:creationId xmlns:p14="http://schemas.microsoft.com/office/powerpoint/2010/main" val="680317386"/>
+      </p:ext>
+    </p:extLst>
+  </p:cSld>
+  <p:clrMapOvr>
+    <a:masterClrMapping/>
+  </p:clrMapOvr>
+</p:sld>
+</file>
+
+<file path=ppt/slides/slide3.xml><?xml version="1.0" encoding="utf-8"?>
+<p:sld xmlns:a="http://schemas.openxmlformats.org/drawingml/2006/main" xmlns:r="http://schemas.openxmlformats.org/officeDocument/2006/relationships" xmlns:p="http://schemas.openxmlformats.org/presentationml/2006/main">
+  <p:cSld>
+    <p:spTree>
+      <p:nvGrpSpPr>
+        <p:cNvPr id="1" name=""/>
+        <p:cNvGrpSpPr/>
+        <p:nvPr/>
+      </p:nvGrpSpPr>
+      <p:grpSpPr>
+        <a:xfrm>
+          <a:off x="0" y="0"/>
+          <a:ext cx="0" cy="0"/>
+          <a:chOff x="0" y="0"/>
+          <a:chExt cx="0" cy="0"/>
+        </a:xfrm>
+      </p:grpSpPr>
+      <p:pic>
+        <p:nvPicPr>
+          <p:cNvPr id="2050" name="Picture 2" descr="The machine learning pipeline and attacks · Embrace The Red">
+            <a:extLst>
+              <a:ext uri="{FF2B5EF4-FFF2-40B4-BE49-F238E27FC236}">
+                <a16:creationId xmlns:a16="http://schemas.microsoft.com/office/drawing/2014/main" id="{FC043195-6D59-1671-5C08-A7FC2A60AC1C}"/>
+              </a:ext>
+            </a:extLst>
+          </p:cNvPr>
+          <p:cNvPicPr>
+            <a:picLocks noChangeAspect="1" noChangeArrowheads="1"/>
+          </p:cNvPicPr>
+          <p:nvPr/>
+        </p:nvPicPr>
+        <p:blipFill>
+          <a:blip r:embed="rId2">
+            <a:extLst>
+              <a:ext uri="{28A0092B-C50C-407E-A947-70E740481C1C}">
+                <a14:useLocalDpi xmlns:a14="http://schemas.microsoft.com/office/drawing/2010/main" val="0"/>
+              </a:ext>
+            </a:extLst>
+          </a:blip>
+          <a:srcRect/>
+          <a:stretch>
+            <a:fillRect/>
+          </a:stretch>
+        </p:blipFill>
+        <p:spPr bwMode="auto">
+          <a:xfrm>
+            <a:off x="613640" y="472238"/>
+            <a:ext cx="10964719" cy="5913524"/>
+          </a:xfrm>
+          <a:prstGeom prst="rect">
+            <a:avLst/>
+          </a:prstGeom>
+          <a:noFill/>
+          <a:extLst>
+            <a:ext uri="{909E8E84-426E-40DD-AFC4-6F175D3DCCD1}">
+              <a14:hiddenFill xmlns:a14="http://schemas.microsoft.com/office/drawing/2010/main">
+                <a:solidFill>
+                  <a:srgbClr val="FFFFFF"/>
+                </a:solidFill>
+              </a14:hiddenFill>
+            </a:ext>
+          </a:extLst>
+        </p:spPr>
+      </p:pic>
+    </p:spTree>
+    <p:extLst>
+      <p:ext uri="{BB962C8B-B14F-4D97-AF65-F5344CB8AC3E}">
+        <p14:creationId xmlns:p14="http://schemas.microsoft.com/office/powerpoint/2010/main" val="276456462"/>
+      </p:ext>
+    </p:extLst>
+  </p:cSld>
+  <p:clrMapOvr>
+    <a:masterClrMapping/>
+  </p:clrMapOvr>
+</p:sld>
+</file>
+
+<file path=ppt/slides/slide4.xml><?xml version="1.0" encoding="utf-8"?>
+<p:sld xmlns:a="http://schemas.openxmlformats.org/drawingml/2006/main" xmlns:r="http://schemas.openxmlformats.org/officeDocument/2006/relationships" xmlns:p="http://schemas.openxmlformats.org/presentationml/2006/main">
+  <p:cSld>
+    <p:spTree>
+      <p:nvGrpSpPr>
+        <p:cNvPr id="1" name=""/>
+        <p:cNvGrpSpPr/>
+        <p:nvPr/>
+      </p:nvGrpSpPr>
+      <p:grpSpPr>
+        <a:xfrm>
+          <a:off x="0" y="0"/>
+          <a:ext cx="0" cy="0"/>
+          <a:chOff x="0" y="0"/>
+          <a:chExt cx="0" cy="0"/>
+        </a:xfrm>
+      </p:grpSpPr>
+      <p:pic>
+        <p:nvPicPr>
+          <p:cNvPr id="3074" name="Picture 2" descr="Machine Learning Pipeline - Javatpoint">
+            <a:extLst>
+              <a:ext uri="{FF2B5EF4-FFF2-40B4-BE49-F238E27FC236}">
+                <a16:creationId xmlns:a16="http://schemas.microsoft.com/office/drawing/2014/main" id="{B31A97B4-10FE-EF95-FF91-C89CDD1041E0}"/>
+              </a:ext>
+            </a:extLst>
+          </p:cNvPr>
+          <p:cNvPicPr>
+            <a:picLocks noChangeAspect="1" noChangeArrowheads="1"/>
+          </p:cNvPicPr>
+          <p:nvPr/>
+        </p:nvPicPr>
+        <p:blipFill>
+          <a:blip r:embed="rId2">
+            <a:extLst>
+              <a:ext uri="{28A0092B-C50C-407E-A947-70E740481C1C}">
+                <a14:useLocalDpi xmlns:a14="http://schemas.microsoft.com/office/drawing/2010/main" val="0"/>
+              </a:ext>
+            </a:extLst>
+          </a:blip>
+          <a:srcRect/>
+          <a:stretch>
+            <a:fillRect/>
+          </a:stretch>
+        </p:blipFill>
+        <p:spPr bwMode="auto">
+          <a:xfrm>
+            <a:off x="1333500" y="2222500"/>
+            <a:ext cx="9525000" cy="2413000"/>
+          </a:xfrm>
+          <a:prstGeom prst="rect">
+            <a:avLst/>
+          </a:prstGeom>
+          <a:noFill/>
+          <a:extLst>
+            <a:ext uri="{909E8E84-426E-40DD-AFC4-6F175D3DCCD1}">
+              <a14:hiddenFill xmlns:a14="http://schemas.microsoft.com/office/drawing/2010/main">
+                <a:solidFill>
+                  <a:srgbClr val="FFFFFF"/>
+                </a:solidFill>
+              </a14:hiddenFill>
+            </a:ext>
+          </a:extLst>
+        </p:spPr>
+      </p:pic>
+    </p:spTree>
+    <p:extLst>
+      <p:ext uri="{BB962C8B-B14F-4D97-AF65-F5344CB8AC3E}">
+        <p14:creationId xmlns:p14="http://schemas.microsoft.com/office/powerpoint/2010/main" val="2804925914"/>
+      </p:ext>
+    </p:extLst>
+  </p:cSld>
+  <p:clrMapOvr>
+    <a:masterClrMapping/>
+  </p:clrMapOvr>
+</p:sld>
+</file>
+
+<file path=ppt/slides/slide5.xml><?xml version="1.0" encoding="utf-8"?>
+<p:sld xmlns:a="http://schemas.openxmlformats.org/drawingml/2006/main" xmlns:r="http://schemas.openxmlformats.org/officeDocument/2006/relationships" xmlns:p="http://schemas.openxmlformats.org/presentationml/2006/main">
+  <p:cSld>
+    <p:spTree>
+      <p:nvGrpSpPr>
+        <p:cNvPr id="1" name=""/>
+        <p:cNvGrpSpPr/>
+        <p:nvPr/>
+      </p:nvGrpSpPr>
+      <p:grpSpPr>
+        <a:xfrm>
+          <a:off x="0" y="0"/>
+          <a:ext cx="0" cy="0"/>
+          <a:chOff x="0" y="0"/>
+          <a:chExt cx="0" cy="0"/>
+        </a:xfrm>
+      </p:grpSpPr>
+      <p:grpSp>
+        <p:nvGrpSpPr>
+          <p:cNvPr id="14" name="Group 13">
+            <a:extLst>
+              <a:ext uri="{FF2B5EF4-FFF2-40B4-BE49-F238E27FC236}">
+                <a16:creationId xmlns:a16="http://schemas.microsoft.com/office/drawing/2014/main" id="{54A7B5B3-EE73-43F5-6FBB-0F7EB94E95F4}"/>
+              </a:ext>
+            </a:extLst>
+          </p:cNvPr>
+          <p:cNvGrpSpPr/>
+          <p:nvPr/>
+        </p:nvGrpSpPr>
+        <p:grpSpPr>
+          <a:xfrm>
+            <a:off x="2144110" y="2375338"/>
+            <a:ext cx="2879835" cy="1450428"/>
+            <a:chOff x="2144110" y="2375338"/>
+            <a:chExt cx="2879835" cy="1450428"/>
+          </a:xfrm>
+        </p:grpSpPr>
+        <p:sp>
+          <p:nvSpPr>
+            <p:cNvPr id="4" name="Rounded Rectangle 3">
+              <a:extLst>
+                <a:ext uri="{FF2B5EF4-FFF2-40B4-BE49-F238E27FC236}">
+                  <a16:creationId xmlns:a16="http://schemas.microsoft.com/office/drawing/2014/main" id="{0B7FAE49-F690-002B-592B-D065BDE7CCB1}"/>
+                </a:ext>
+              </a:extLst>
+            </p:cNvPr>
+            <p:cNvSpPr/>
+            <p:nvPr/>
+          </p:nvSpPr>
+          <p:spPr>
+            <a:xfrm>
+              <a:off x="2144110" y="2375338"/>
+              <a:ext cx="2879835" cy="1450428"/>
+            </a:xfrm>
+            <a:prstGeom prst="roundRect">
+              <a:avLst/>
+            </a:prstGeom>
+            <a:noFill/>
+            <a:ln w="38100">
+              <a:solidFill>
+                <a:schemeClr val="tx1"/>
+              </a:solidFill>
+            </a:ln>
+          </p:spPr>
+          <p:style>
+            <a:lnRef idx="2">
+              <a:schemeClr val="accent1">
+                <a:shade val="50000"/>
+              </a:schemeClr>
+            </a:lnRef>
+            <a:fillRef idx="1">
+              <a:schemeClr val="accent1"/>
+            </a:fillRef>
+            <a:effectRef idx="0">
+              <a:schemeClr val="accent1"/>
+            </a:effectRef>
+            <a:fontRef idx="minor">
+              <a:schemeClr val="lt1"/>
+            </a:fontRef>
+          </p:style>
+          <p:txBody>
+            <a:bodyPr rtlCol="0" anchor="ctr"/>
+            <a:lstStyle/>
+            <a:p>
+              <a:pPr algn="ctr"/>
+              <a:endParaRPr lang="en-GB"/>
+            </a:p>
+          </p:txBody>
+        </p:sp>
+        <p:sp>
+          <p:nvSpPr>
+            <p:cNvPr id="6" name="TextBox 5">
+              <a:extLst>
+                <a:ext uri="{FF2B5EF4-FFF2-40B4-BE49-F238E27FC236}">
+                  <a16:creationId xmlns:a16="http://schemas.microsoft.com/office/drawing/2014/main" id="{8A1C074C-4F01-15D8-9A9F-CFC7927A8F5D}"/>
+                </a:ext>
+              </a:extLst>
+            </p:cNvPr>
+            <p:cNvSpPr txBox="1"/>
+            <p:nvPr/>
+          </p:nvSpPr>
+          <p:spPr>
+            <a:xfrm>
+              <a:off x="3011691" y="2915886"/>
+              <a:ext cx="1144672" cy="369332"/>
+            </a:xfrm>
+            <a:prstGeom prst="rect">
+              <a:avLst/>
+            </a:prstGeom>
+            <a:noFill/>
+          </p:spPr>
+          <p:txBody>
+            <a:bodyPr wrap="none" rtlCol="0">
+              <a:spAutoFit/>
+            </a:bodyPr>
+            <a:lstStyle/>
+            <a:p>
+              <a:r>
+                <a:rPr lang="en-GB" dirty="0">
+                  <a:latin typeface="American Typewriter" panose="02090604020004020304" pitchFamily="18" charset="77"/>
+                </a:rPr>
+                <a:t>Training</a:t>
+              </a:r>
+            </a:p>
+          </p:txBody>
+        </p:sp>
+      </p:grpSp>
+      <p:grpSp>
+        <p:nvGrpSpPr>
+          <p:cNvPr id="13" name="Group 12">
+            <a:extLst>
+              <a:ext uri="{FF2B5EF4-FFF2-40B4-BE49-F238E27FC236}">
+                <a16:creationId xmlns:a16="http://schemas.microsoft.com/office/drawing/2014/main" id="{45073B9F-3F51-544D-7FB4-0BA2F3E5E72A}"/>
+              </a:ext>
+            </a:extLst>
+          </p:cNvPr>
+          <p:cNvGrpSpPr/>
+          <p:nvPr/>
+        </p:nvGrpSpPr>
+        <p:grpSpPr>
+          <a:xfrm>
+            <a:off x="7678183" y="2375338"/>
+            <a:ext cx="2879835" cy="1450428"/>
+            <a:chOff x="7362496" y="2375338"/>
+            <a:chExt cx="2879835" cy="1450428"/>
+          </a:xfrm>
+        </p:grpSpPr>
+        <p:sp>
+          <p:nvSpPr>
+            <p:cNvPr id="5" name="Rounded Rectangle 4">
+              <a:extLst>
+                <a:ext uri="{FF2B5EF4-FFF2-40B4-BE49-F238E27FC236}">
+                  <a16:creationId xmlns:a16="http://schemas.microsoft.com/office/drawing/2014/main" id="{428932BF-3C1C-8A20-E990-C84881041ACA}"/>
+                </a:ext>
+              </a:extLst>
+            </p:cNvPr>
+            <p:cNvSpPr/>
+            <p:nvPr/>
+          </p:nvSpPr>
+          <p:spPr>
+            <a:xfrm>
+              <a:off x="7362496" y="2375338"/>
+              <a:ext cx="2879835" cy="1450428"/>
+            </a:xfrm>
+            <a:prstGeom prst="roundRect">
+              <a:avLst/>
+            </a:prstGeom>
+            <a:noFill/>
+            <a:ln w="38100">
+              <a:solidFill>
+                <a:schemeClr val="tx1"/>
+              </a:solidFill>
+            </a:ln>
+          </p:spPr>
+          <p:style>
+            <a:lnRef idx="2">
+              <a:schemeClr val="accent1">
+                <a:shade val="50000"/>
+              </a:schemeClr>
+            </a:lnRef>
+            <a:fillRef idx="1">
+              <a:schemeClr val="accent1"/>
+            </a:fillRef>
+            <a:effectRef idx="0">
+              <a:schemeClr val="accent1"/>
+            </a:effectRef>
+            <a:fontRef idx="minor">
+              <a:schemeClr val="lt1"/>
+            </a:fontRef>
+          </p:style>
+          <p:txBody>
+            <a:bodyPr rtlCol="0" anchor="ctr"/>
+            <a:lstStyle/>
+            <a:p>
+              <a:pPr algn="ctr"/>
+              <a:endParaRPr lang="en-GB"/>
+            </a:p>
+          </p:txBody>
+        </p:sp>
+        <p:sp>
+          <p:nvSpPr>
+            <p:cNvPr id="7" name="TextBox 6">
+              <a:extLst>
+                <a:ext uri="{FF2B5EF4-FFF2-40B4-BE49-F238E27FC236}">
+                  <a16:creationId xmlns:a16="http://schemas.microsoft.com/office/drawing/2014/main" id="{AC88C51E-9EE3-5CA0-5C3C-07C6D1D608F7}"/>
+                </a:ext>
+              </a:extLst>
+            </p:cNvPr>
+            <p:cNvSpPr txBox="1"/>
+            <p:nvPr/>
+          </p:nvSpPr>
+          <p:spPr>
+            <a:xfrm>
+              <a:off x="8135403" y="2914401"/>
+              <a:ext cx="1409360" cy="369332"/>
+            </a:xfrm>
+            <a:prstGeom prst="rect">
+              <a:avLst/>
+            </a:prstGeom>
+            <a:noFill/>
+          </p:spPr>
+          <p:txBody>
+            <a:bodyPr wrap="none" rtlCol="0">
+              <a:spAutoFit/>
+            </a:bodyPr>
+            <a:lstStyle/>
+            <a:p>
+              <a:r>
+                <a:rPr lang="en-GB" dirty="0">
+                  <a:latin typeface="American Typewriter" panose="02090604020004020304" pitchFamily="18" charset="77"/>
+                </a:rPr>
+                <a:t>Production</a:t>
+              </a:r>
+            </a:p>
+          </p:txBody>
+        </p:sp>
+      </p:grpSp>
+      <p:cxnSp>
+        <p:nvCxnSpPr>
+          <p:cNvPr id="9" name="Straight Arrow Connector 8">
+            <a:extLst>
+              <a:ext uri="{FF2B5EF4-FFF2-40B4-BE49-F238E27FC236}">
+                <a16:creationId xmlns:a16="http://schemas.microsoft.com/office/drawing/2014/main" id="{2E341251-89A0-6538-94F1-1E0574802788}"/>
+              </a:ext>
+            </a:extLst>
+          </p:cNvPr>
+          <p:cNvCxnSpPr>
+            <a:cxnSpLocks/>
+            <a:endCxn id="4" idx="1"/>
+          </p:cNvCxnSpPr>
+          <p:nvPr/>
+        </p:nvCxnSpPr>
+        <p:spPr>
+          <a:xfrm>
+            <a:off x="522514" y="3100552"/>
+            <a:ext cx="1621596" cy="0"/>
+          </a:xfrm>
+          <a:prstGeom prst="straightConnector1">
+            <a:avLst/>
+          </a:prstGeom>
+          <a:ln w="38100">
+            <a:solidFill>
+              <a:schemeClr val="tx1"/>
+            </a:solidFill>
+            <a:tailEnd type="triangle"/>
+          </a:ln>
+        </p:spPr>
+        <p:style>
+          <a:lnRef idx="1">
+            <a:schemeClr val="accent1"/>
+          </a:lnRef>
+          <a:fillRef idx="0">
+            <a:schemeClr val="accent1"/>
+          </a:fillRef>
+          <a:effectRef idx="0">
+            <a:schemeClr val="accent1"/>
+          </a:effectRef>
+          <a:fontRef idx="minor">
+            <a:schemeClr val="tx1"/>
+          </a:fontRef>
+        </p:style>
+      </p:cxnSp>
+      <p:cxnSp>
+        <p:nvCxnSpPr>
+          <p:cNvPr id="12" name="Straight Arrow Connector 11">
+            <a:extLst>
+              <a:ext uri="{FF2B5EF4-FFF2-40B4-BE49-F238E27FC236}">
+                <a16:creationId xmlns:a16="http://schemas.microsoft.com/office/drawing/2014/main" id="{A7251268-76E0-9127-2268-DDABF1783427}"/>
+              </a:ext>
+            </a:extLst>
+          </p:cNvPr>
+          <p:cNvCxnSpPr>
+            <a:stCxn id="4" idx="3"/>
+          </p:cNvCxnSpPr>
+          <p:nvPr/>
+        </p:nvCxnSpPr>
+        <p:spPr>
+          <a:xfrm>
+            <a:off x="5023944" y="3100552"/>
+            <a:ext cx="1080000" cy="0"/>
+          </a:xfrm>
+          <a:prstGeom prst="straightConnector1">
+            <a:avLst/>
+          </a:prstGeom>
+          <a:ln w="38100">
+            <a:solidFill>
+              <a:schemeClr val="tx1"/>
+            </a:solidFill>
+            <a:tailEnd type="triangle"/>
+          </a:ln>
+        </p:spPr>
+        <p:style>
+          <a:lnRef idx="1">
+            <a:schemeClr val="accent1"/>
+          </a:lnRef>
+          <a:fillRef idx="0">
+            <a:schemeClr val="accent1"/>
+          </a:fillRef>
+          <a:effectRef idx="0">
+            <a:schemeClr val="accent1"/>
+          </a:effectRef>
+          <a:fontRef idx="minor">
+            <a:schemeClr val="tx1"/>
+          </a:fontRef>
+        </p:style>
+      </p:cxnSp>
+      <p:cxnSp>
+        <p:nvCxnSpPr>
+          <p:cNvPr id="16" name="Straight Arrow Connector 15">
+            <a:extLst>
+              <a:ext uri="{FF2B5EF4-FFF2-40B4-BE49-F238E27FC236}">
+                <a16:creationId xmlns:a16="http://schemas.microsoft.com/office/drawing/2014/main" id="{0C98DB20-3728-8076-1EC4-C49098677914}"/>
+              </a:ext>
+            </a:extLst>
+          </p:cNvPr>
+          <p:cNvCxnSpPr>
+            <a:endCxn id="5" idx="2"/>
+          </p:cNvCxnSpPr>
+          <p:nvPr/>
+        </p:nvCxnSpPr>
+        <p:spPr>
+          <a:xfrm flipV="1">
+            <a:off x="9118100" y="3825766"/>
+            <a:ext cx="1" cy="1061920"/>
+          </a:xfrm>
+          <a:prstGeom prst="straightConnector1">
+            <a:avLst/>
+          </a:prstGeom>
+          <a:ln w="38100">
+            <a:solidFill>
+              <a:schemeClr val="tx1"/>
+            </a:solidFill>
+            <a:tailEnd type="triangle"/>
+          </a:ln>
+        </p:spPr>
+        <p:style>
+          <a:lnRef idx="1">
+            <a:schemeClr val="accent1"/>
+          </a:lnRef>
+          <a:fillRef idx="0">
+            <a:schemeClr val="accent1"/>
+          </a:fillRef>
+          <a:effectRef idx="0">
+            <a:schemeClr val="accent1"/>
+          </a:effectRef>
+          <a:fontRef idx="minor">
+            <a:schemeClr val="tx1"/>
+          </a:fontRef>
+        </p:style>
+      </p:cxnSp>
+      <p:cxnSp>
+        <p:nvCxnSpPr>
+          <p:cNvPr id="18" name="Straight Arrow Connector 17">
+            <a:extLst>
+              <a:ext uri="{FF2B5EF4-FFF2-40B4-BE49-F238E27FC236}">
+                <a16:creationId xmlns:a16="http://schemas.microsoft.com/office/drawing/2014/main" id="{EF341BD5-BCD4-01A0-FF9E-278AC33284FD}"/>
+              </a:ext>
+            </a:extLst>
+          </p:cNvPr>
+          <p:cNvCxnSpPr>
+            <a:cxnSpLocks/>
+            <a:stCxn id="5" idx="3"/>
+          </p:cNvCxnSpPr>
+          <p:nvPr/>
+        </p:nvCxnSpPr>
+        <p:spPr>
+          <a:xfrm flipV="1">
+            <a:off x="10558018" y="3099067"/>
+            <a:ext cx="1080000" cy="1485"/>
+          </a:xfrm>
+          <a:prstGeom prst="straightConnector1">
+            <a:avLst/>
+          </a:prstGeom>
+          <a:ln w="38100">
+            <a:solidFill>
+              <a:schemeClr val="tx1"/>
+            </a:solidFill>
+            <a:tailEnd type="triangle"/>
+          </a:ln>
+        </p:spPr>
+        <p:style>
+          <a:lnRef idx="1">
+            <a:schemeClr val="accent1"/>
+          </a:lnRef>
+          <a:fillRef idx="0">
+            <a:schemeClr val="accent1"/>
+          </a:fillRef>
+          <a:effectRef idx="0">
+            <a:schemeClr val="accent1"/>
+          </a:effectRef>
+          <a:fontRef idx="minor">
+            <a:schemeClr val="tx1"/>
+          </a:fontRef>
+        </p:style>
+      </p:cxnSp>
+      <p:pic>
+        <p:nvPicPr>
+          <p:cNvPr id="24" name="Graphic 23">
+            <a:extLst>
+              <a:ext uri="{FF2B5EF4-FFF2-40B4-BE49-F238E27FC236}">
+                <a16:creationId xmlns:a16="http://schemas.microsoft.com/office/drawing/2014/main" id="{0123BE23-5767-5D33-6E28-AF1F107BB870}"/>
+              </a:ext>
+            </a:extLst>
+          </p:cNvPr>
+          <p:cNvPicPr>
+            <a:picLocks noChangeAspect="1"/>
+          </p:cNvPicPr>
+          <p:nvPr/>
+        </p:nvPicPr>
+        <p:blipFill>
+          <a:blip r:embed="rId3">
+            <a:extLst>
+              <a:ext uri="{96DAC541-7B7A-43D3-8B79-37D633B846F1}">
+                <asvg:svgBlip xmlns:asvg="http://schemas.microsoft.com/office/drawing/2016/SVG/main" r:embed="rId4"/>
+              </a:ext>
+            </a:extLst>
+          </a:blip>
+          <a:stretch>
+            <a:fillRect/>
+          </a:stretch>
+        </p:blipFill>
+        <p:spPr>
+          <a:xfrm>
+            <a:off x="6298638" y="3429000"/>
+            <a:ext cx="511200" cy="511200"/>
+          </a:xfrm>
+          <a:prstGeom prst="rect">
+            <a:avLst/>
+          </a:prstGeom>
+        </p:spPr>
+      </p:pic>
+      <p:pic>
+        <p:nvPicPr>
+          <p:cNvPr id="26" name="Graphic 25">
+            <a:extLst>
+              <a:ext uri="{FF2B5EF4-FFF2-40B4-BE49-F238E27FC236}">
+                <a16:creationId xmlns:a16="http://schemas.microsoft.com/office/drawing/2014/main" id="{AB81842D-A4F6-099A-8589-F098E0E3DC56}"/>
+              </a:ext>
+            </a:extLst>
+          </p:cNvPr>
+          <p:cNvPicPr>
+            <a:picLocks noChangeAspect="1"/>
+          </p:cNvPicPr>
+          <p:nvPr/>
+        </p:nvPicPr>
+        <p:blipFill>
+          <a:blip r:embed="rId5">
+            <a:extLst>
+              <a:ext uri="{96DAC541-7B7A-43D3-8B79-37D633B846F1}">
+                <asvg:svgBlip xmlns:asvg="http://schemas.microsoft.com/office/drawing/2016/SVG/main" r:embed="rId6"/>
+              </a:ext>
+            </a:extLst>
+          </a:blip>
+          <a:stretch>
+            <a:fillRect/>
+          </a:stretch>
+        </p:blipFill>
+        <p:spPr>
+          <a:xfrm>
+            <a:off x="6301815" y="2406378"/>
+            <a:ext cx="508023" cy="508023"/>
+          </a:xfrm>
+          <a:prstGeom prst="rect">
+            <a:avLst/>
+          </a:prstGeom>
+        </p:spPr>
+      </p:pic>
+      <p:sp>
+        <p:nvSpPr>
+          <p:cNvPr id="27" name="TextBox 26">
+            <a:extLst>
+              <a:ext uri="{FF2B5EF4-FFF2-40B4-BE49-F238E27FC236}">
+                <a16:creationId xmlns:a16="http://schemas.microsoft.com/office/drawing/2014/main" id="{4CF4B48D-91F5-F9D8-4BE0-D87FC272F619}"/>
+              </a:ext>
+            </a:extLst>
+          </p:cNvPr>
+          <p:cNvSpPr txBox="1"/>
+          <p:nvPr/>
+        </p:nvSpPr>
+        <p:spPr>
+          <a:xfrm>
+            <a:off x="8403802" y="1463973"/>
+            <a:ext cx="1428596" cy="369332"/>
+          </a:xfrm>
+          <a:prstGeom prst="rect">
+            <a:avLst/>
+          </a:prstGeom>
+          <a:noFill/>
+        </p:spPr>
+        <p:txBody>
+          <a:bodyPr wrap="none" rtlCol="0">
+            <a:spAutoFit/>
+          </a:bodyPr>
+          <a:lstStyle/>
+          <a:p>
+            <a:r>
+              <a:rPr lang="en-GB" dirty="0">
+                <a:latin typeface="American Typewriter" panose="02090604020004020304" pitchFamily="18" charset="77"/>
+              </a:rPr>
+              <a:t>Monitoring</a:t>
+            </a:r>
+          </a:p>
+        </p:txBody>
+      </p:sp>
+      <p:cxnSp>
+        <p:nvCxnSpPr>
+          <p:cNvPr id="29" name="Curved Connector 28">
+            <a:extLst>
+              <a:ext uri="{FF2B5EF4-FFF2-40B4-BE49-F238E27FC236}">
+                <a16:creationId xmlns:a16="http://schemas.microsoft.com/office/drawing/2014/main" id="{430F2D6E-2E32-9562-99D3-00A159FCE336}"/>
+              </a:ext>
+            </a:extLst>
+          </p:cNvPr>
+          <p:cNvCxnSpPr>
+            <a:cxnSpLocks/>
+            <a:stCxn id="27" idx="1"/>
+            <a:endCxn id="4" idx="0"/>
+          </p:cNvCxnSpPr>
+          <p:nvPr/>
+        </p:nvCxnSpPr>
+        <p:spPr>
+          <a:xfrm rot="10800000" flipV="1">
+            <a:off x="3584028" y="1648638"/>
+            <a:ext cx="4819774" cy="726699"/>
+          </a:xfrm>
+          <a:prstGeom prst="curvedConnector2">
+            <a:avLst/>
+          </a:prstGeom>
+          <a:ln w="38100">
+            <a:solidFill>
+              <a:schemeClr val="tx1"/>
+            </a:solidFill>
+            <a:tailEnd type="triangle"/>
+          </a:ln>
+        </p:spPr>
+        <p:style>
+          <a:lnRef idx="1">
+            <a:schemeClr val="accent1"/>
+          </a:lnRef>
+          <a:fillRef idx="0">
+            <a:schemeClr val="accent1"/>
+          </a:fillRef>
+          <a:effectRef idx="0">
+            <a:schemeClr val="accent1"/>
+          </a:effectRef>
+          <a:fontRef idx="minor">
+            <a:schemeClr val="tx1"/>
+          </a:fontRef>
+        </p:style>
+      </p:cxnSp>
+      <p:cxnSp>
+        <p:nvCxnSpPr>
+          <p:cNvPr id="46" name="Curved Connector 45">
+            <a:extLst>
+              <a:ext uri="{FF2B5EF4-FFF2-40B4-BE49-F238E27FC236}">
+                <a16:creationId xmlns:a16="http://schemas.microsoft.com/office/drawing/2014/main" id="{E6B7BDA6-E1C1-12A4-68A1-19BB96BE6700}"/>
+              </a:ext>
+            </a:extLst>
+          </p:cNvPr>
+          <p:cNvCxnSpPr>
+            <a:cxnSpLocks/>
+            <a:stCxn id="26" idx="3"/>
+            <a:endCxn id="7" idx="0"/>
+          </p:cNvCxnSpPr>
+          <p:nvPr/>
+        </p:nvCxnSpPr>
+        <p:spPr>
+          <a:xfrm>
+            <a:off x="6809838" y="2660390"/>
+            <a:ext cx="2345932" cy="254011"/>
+          </a:xfrm>
+          <a:prstGeom prst="curvedConnector2">
+            <a:avLst/>
+          </a:prstGeom>
+          <a:ln w="38100">
+            <a:solidFill>
+              <a:schemeClr val="tx1"/>
+            </a:solidFill>
+            <a:tailEnd type="triangle"/>
+          </a:ln>
+        </p:spPr>
+        <p:style>
+          <a:lnRef idx="1">
+            <a:schemeClr val="accent1"/>
+          </a:lnRef>
+          <a:fillRef idx="0">
+            <a:schemeClr val="accent1"/>
+          </a:fillRef>
+          <a:effectRef idx="0">
+            <a:schemeClr val="accent1"/>
+          </a:effectRef>
+          <a:fontRef idx="minor">
+            <a:schemeClr val="tx1"/>
+          </a:fontRef>
+        </p:style>
+      </p:cxnSp>
+      <p:cxnSp>
+        <p:nvCxnSpPr>
+          <p:cNvPr id="62" name="Curved Connector 61">
+            <a:extLst>
+              <a:ext uri="{FF2B5EF4-FFF2-40B4-BE49-F238E27FC236}">
+                <a16:creationId xmlns:a16="http://schemas.microsoft.com/office/drawing/2014/main" id="{749DE5E9-F0A0-B315-9ABF-74B21C2B353F}"/>
+              </a:ext>
+            </a:extLst>
+          </p:cNvPr>
+          <p:cNvCxnSpPr>
+            <a:cxnSpLocks/>
+            <a:stCxn id="24" idx="2"/>
+          </p:cNvCxnSpPr>
+          <p:nvPr/>
+        </p:nvCxnSpPr>
+        <p:spPr>
+          <a:xfrm rot="5400000" flipH="1">
+            <a:off x="3492148" y="878110"/>
+            <a:ext cx="712942" cy="5411238"/>
+          </a:xfrm>
+          <a:prstGeom prst="curvedConnector4">
+            <a:avLst>
+              <a:gd name="adj1" fmla="val -70236"/>
+              <a:gd name="adj2" fmla="val 103056"/>
+            </a:avLst>
+          </a:prstGeom>
+          <a:ln w="38100">
+            <a:solidFill>
+              <a:schemeClr val="tx1"/>
+            </a:solidFill>
+            <a:tailEnd type="triangle"/>
+          </a:ln>
+        </p:spPr>
+        <p:style>
+          <a:lnRef idx="1">
+            <a:schemeClr val="accent1"/>
+          </a:lnRef>
+          <a:fillRef idx="0">
+            <a:schemeClr val="accent1"/>
+          </a:fillRef>
+          <a:effectRef idx="0">
+            <a:schemeClr val="accent1"/>
+          </a:effectRef>
+          <a:fontRef idx="minor">
+            <a:schemeClr val="tx1"/>
+          </a:fontRef>
+        </p:style>
+      </p:cxnSp>
+      <p:sp>
+        <p:nvSpPr>
+          <p:cNvPr id="73" name="TextBox 72">
+            <a:extLst>
+              <a:ext uri="{FF2B5EF4-FFF2-40B4-BE49-F238E27FC236}">
+                <a16:creationId xmlns:a16="http://schemas.microsoft.com/office/drawing/2014/main" id="{6D6C697D-94CD-363D-2FE8-7ABCD4E560F3}"/>
+              </a:ext>
+            </a:extLst>
+          </p:cNvPr>
+          <p:cNvSpPr txBox="1"/>
+          <p:nvPr/>
+        </p:nvSpPr>
+        <p:spPr>
+          <a:xfrm>
+            <a:off x="5037700" y="2745042"/>
+            <a:ext cx="944489" cy="369332"/>
+          </a:xfrm>
+          <a:prstGeom prst="rect">
+            <a:avLst/>
+          </a:prstGeom>
+          <a:noFill/>
+        </p:spPr>
+        <p:txBody>
+          <a:bodyPr wrap="none" rtlCol="0">
+            <a:spAutoFit/>
+          </a:bodyPr>
+          <a:lstStyle/>
+          <a:p>
+            <a:r>
+              <a:rPr lang="en-GB" dirty="0">
+                <a:latin typeface="American Typewriter" panose="02090604020004020304" pitchFamily="18" charset="77"/>
+              </a:rPr>
+              <a:t>Output</a:t>
+            </a:r>
+          </a:p>
+        </p:txBody>
+      </p:sp>
+      <p:sp>
+        <p:nvSpPr>
+          <p:cNvPr id="74" name="TextBox 73">
+            <a:extLst>
+              <a:ext uri="{FF2B5EF4-FFF2-40B4-BE49-F238E27FC236}">
+                <a16:creationId xmlns:a16="http://schemas.microsoft.com/office/drawing/2014/main" id="{B5058AE1-4563-05AF-8035-95B52B45F4DF}"/>
+              </a:ext>
+            </a:extLst>
+          </p:cNvPr>
+          <p:cNvSpPr txBox="1"/>
+          <p:nvPr/>
+        </p:nvSpPr>
+        <p:spPr>
+          <a:xfrm>
+            <a:off x="10576286" y="2728356"/>
+            <a:ext cx="944489" cy="369332"/>
+          </a:xfrm>
+          <a:prstGeom prst="rect">
+            <a:avLst/>
+          </a:prstGeom>
+          <a:noFill/>
+        </p:spPr>
+        <p:txBody>
+          <a:bodyPr wrap="none" rtlCol="0">
+            <a:spAutoFit/>
+          </a:bodyPr>
+          <a:lstStyle/>
+          <a:p>
+            <a:r>
+              <a:rPr lang="en-GB" dirty="0">
+                <a:latin typeface="American Typewriter" panose="02090604020004020304" pitchFamily="18" charset="77"/>
+              </a:rPr>
+              <a:t>Output</a:t>
+            </a:r>
+          </a:p>
+        </p:txBody>
+      </p:sp>
+      <p:sp>
+        <p:nvSpPr>
+          <p:cNvPr id="76" name="TextBox 75">
+            <a:extLst>
+              <a:ext uri="{FF2B5EF4-FFF2-40B4-BE49-F238E27FC236}">
+                <a16:creationId xmlns:a16="http://schemas.microsoft.com/office/drawing/2014/main" id="{FD1728AC-E721-5324-6878-324FBCE747A5}"/>
+              </a:ext>
+            </a:extLst>
+          </p:cNvPr>
+          <p:cNvSpPr txBox="1"/>
+          <p:nvPr/>
+        </p:nvSpPr>
+        <p:spPr>
+          <a:xfrm>
+            <a:off x="8229182" y="4049927"/>
+            <a:ext cx="901593" cy="646331"/>
+          </a:xfrm>
+          <a:prstGeom prst="rect">
+            <a:avLst/>
+          </a:prstGeom>
+          <a:noFill/>
+        </p:spPr>
+        <p:txBody>
+          <a:bodyPr wrap="none" rtlCol="0">
+            <a:spAutoFit/>
+          </a:bodyPr>
+          <a:lstStyle/>
+          <a:p>
+            <a:pPr algn="r"/>
+            <a:r>
+              <a:rPr lang="en-GB" dirty="0">
+                <a:latin typeface="American Typewriter" panose="02090604020004020304" pitchFamily="18" charset="77"/>
+              </a:rPr>
+              <a:t>Live </a:t>
+            </a:r>
+          </a:p>
+          <a:p>
+            <a:pPr algn="r"/>
+            <a:r>
+              <a:rPr lang="en-GB" dirty="0">
+                <a:latin typeface="American Typewriter" panose="02090604020004020304" pitchFamily="18" charset="77"/>
+              </a:rPr>
+              <a:t>Inputs</a:t>
+            </a:r>
+          </a:p>
+        </p:txBody>
+      </p:sp>
+      <p:sp>
+        <p:nvSpPr>
+          <p:cNvPr id="79" name="TextBox 78">
+            <a:extLst>
+              <a:ext uri="{FF2B5EF4-FFF2-40B4-BE49-F238E27FC236}">
+                <a16:creationId xmlns:a16="http://schemas.microsoft.com/office/drawing/2014/main" id="{A1CA208D-018F-B0A2-BA3A-2C86B7BBD992}"/>
+              </a:ext>
+            </a:extLst>
+          </p:cNvPr>
+          <p:cNvSpPr txBox="1"/>
+          <p:nvPr/>
+        </p:nvSpPr>
+        <p:spPr>
+          <a:xfrm>
+            <a:off x="6773926" y="2309362"/>
+            <a:ext cx="946285" cy="369332"/>
+          </a:xfrm>
+          <a:prstGeom prst="rect">
+            <a:avLst/>
+          </a:prstGeom>
+          <a:noFill/>
+        </p:spPr>
+        <p:txBody>
+          <a:bodyPr wrap="none" rtlCol="0">
+            <a:spAutoFit/>
+          </a:bodyPr>
+          <a:lstStyle/>
+          <a:p>
+            <a:r>
+              <a:rPr lang="en-GB" dirty="0">
+                <a:latin typeface="American Typewriter" panose="02090604020004020304" pitchFamily="18" charset="77"/>
+              </a:rPr>
+              <a:t>Deploy</a:t>
+            </a:r>
+          </a:p>
+        </p:txBody>
+      </p:sp>
+      <p:sp>
+        <p:nvSpPr>
+          <p:cNvPr id="81" name="TextBox 80">
+            <a:extLst>
+              <a:ext uri="{FF2B5EF4-FFF2-40B4-BE49-F238E27FC236}">
+                <a16:creationId xmlns:a16="http://schemas.microsoft.com/office/drawing/2014/main" id="{41272FA8-9739-74A2-9B03-A9828CCD7FEB}"/>
+              </a:ext>
+            </a:extLst>
+          </p:cNvPr>
+          <p:cNvSpPr txBox="1"/>
+          <p:nvPr/>
+        </p:nvSpPr>
+        <p:spPr>
+          <a:xfrm>
+            <a:off x="5563944" y="1335780"/>
+            <a:ext cx="1034770" cy="369332"/>
+          </a:xfrm>
+          <a:prstGeom prst="rect">
+            <a:avLst/>
+          </a:prstGeom>
+          <a:noFill/>
+        </p:spPr>
+        <p:txBody>
+          <a:bodyPr wrap="none" rtlCol="0">
+            <a:spAutoFit/>
+          </a:bodyPr>
+          <a:lstStyle/>
+          <a:p>
+            <a:r>
+              <a:rPr lang="en-GB" dirty="0">
+                <a:latin typeface="American Typewriter" panose="02090604020004020304" pitchFamily="18" charset="77"/>
+              </a:rPr>
+              <a:t>Retrain</a:t>
+            </a:r>
+          </a:p>
+        </p:txBody>
+      </p:sp>
+      <p:sp>
+        <p:nvSpPr>
+          <p:cNvPr id="82" name="TextBox 81">
+            <a:extLst>
+              <a:ext uri="{FF2B5EF4-FFF2-40B4-BE49-F238E27FC236}">
+                <a16:creationId xmlns:a16="http://schemas.microsoft.com/office/drawing/2014/main" id="{5B30B367-2E2A-95FB-9E53-0D7FD0B78E63}"/>
+              </a:ext>
+            </a:extLst>
+          </p:cNvPr>
+          <p:cNvSpPr txBox="1"/>
+          <p:nvPr/>
+        </p:nvSpPr>
+        <p:spPr>
+          <a:xfrm>
+            <a:off x="3111782" y="4422788"/>
+            <a:ext cx="1160895" cy="369332"/>
+          </a:xfrm>
+          <a:prstGeom prst="rect">
+            <a:avLst/>
+          </a:prstGeom>
+          <a:noFill/>
+        </p:spPr>
+        <p:txBody>
+          <a:bodyPr wrap="none" rtlCol="0">
+            <a:spAutoFit/>
+          </a:bodyPr>
+          <a:lstStyle/>
+          <a:p>
+            <a:r>
+              <a:rPr lang="en-GB" dirty="0">
+                <a:latin typeface="American Typewriter" panose="02090604020004020304" pitchFamily="18" charset="77"/>
+              </a:rPr>
+              <a:t>Optimise</a:t>
+            </a:r>
+          </a:p>
+        </p:txBody>
+      </p:sp>
+      <p:sp>
+        <p:nvSpPr>
+          <p:cNvPr id="84" name="TextBox 83">
+            <a:extLst>
+              <a:ext uri="{FF2B5EF4-FFF2-40B4-BE49-F238E27FC236}">
+                <a16:creationId xmlns:a16="http://schemas.microsoft.com/office/drawing/2014/main" id="{1ED4A9B1-F8E9-BEB1-8D3F-552582785029}"/>
+              </a:ext>
+            </a:extLst>
+          </p:cNvPr>
+          <p:cNvSpPr txBox="1"/>
+          <p:nvPr/>
+        </p:nvSpPr>
+        <p:spPr>
+          <a:xfrm>
+            <a:off x="592552" y="2529545"/>
+            <a:ext cx="1374287" cy="584775"/>
+          </a:xfrm>
+          <a:prstGeom prst="rect">
+            <a:avLst/>
+          </a:prstGeom>
+          <a:noFill/>
+        </p:spPr>
+        <p:txBody>
+          <a:bodyPr wrap="none" rtlCol="0">
+            <a:spAutoFit/>
+          </a:bodyPr>
+          <a:lstStyle/>
+          <a:p>
+            <a:r>
+              <a:rPr lang="en-GB" dirty="0">
+                <a:latin typeface="American Typewriter" panose="02090604020004020304" pitchFamily="18" charset="77"/>
+              </a:rPr>
+              <a:t>Inputs:</a:t>
+            </a:r>
+          </a:p>
+          <a:p>
+            <a:r>
+              <a:rPr lang="en-GB" sz="1400" dirty="0">
+                <a:latin typeface="American Typewriter" panose="02090604020004020304" pitchFamily="18" charset="77"/>
+              </a:rPr>
+              <a:t>Data &amp; Config</a:t>
+            </a:r>
+          </a:p>
+        </p:txBody>
+      </p:sp>
+      <p:sp>
+        <p:nvSpPr>
+          <p:cNvPr id="85" name="TextBox 84">
+            <a:extLst>
+              <a:ext uri="{FF2B5EF4-FFF2-40B4-BE49-F238E27FC236}">
+                <a16:creationId xmlns:a16="http://schemas.microsoft.com/office/drawing/2014/main" id="{578DF39A-AD70-93B8-3A1A-B6117EB529FF}"/>
+              </a:ext>
+            </a:extLst>
+          </p:cNvPr>
+          <p:cNvSpPr txBox="1"/>
+          <p:nvPr/>
+        </p:nvSpPr>
+        <p:spPr>
+          <a:xfrm>
+            <a:off x="4070028" y="55083"/>
+            <a:ext cx="4051943" cy="369332"/>
+          </a:xfrm>
+          <a:prstGeom prst="rect">
+            <a:avLst/>
+          </a:prstGeom>
+          <a:noFill/>
+        </p:spPr>
+        <p:txBody>
+          <a:bodyPr wrap="none" rtlCol="0">
+            <a:spAutoFit/>
+          </a:bodyPr>
+          <a:lstStyle/>
+          <a:p>
+            <a:r>
+              <a:rPr lang="en-GB" dirty="0">
+                <a:latin typeface="American Typewriter" panose="02090604020004020304" pitchFamily="18" charset="77"/>
+              </a:rPr>
+              <a:t>Machine Learning Model Workflow</a:t>
+            </a:r>
+          </a:p>
+        </p:txBody>
+      </p:sp>
+      <p:cxnSp>
+        <p:nvCxnSpPr>
+          <p:cNvPr id="89" name="Straight Arrow Connector 88">
+            <a:extLst>
+              <a:ext uri="{FF2B5EF4-FFF2-40B4-BE49-F238E27FC236}">
+                <a16:creationId xmlns:a16="http://schemas.microsoft.com/office/drawing/2014/main" id="{608A9A30-D320-A40F-A025-48B0ABA4EE46}"/>
+              </a:ext>
+            </a:extLst>
+          </p:cNvPr>
+          <p:cNvCxnSpPr>
+            <a:stCxn id="27" idx="2"/>
+            <a:endCxn id="5" idx="0"/>
+          </p:cNvCxnSpPr>
+          <p:nvPr/>
+        </p:nvCxnSpPr>
+        <p:spPr>
+          <a:xfrm>
+            <a:off x="9118100" y="1833305"/>
+            <a:ext cx="1" cy="542033"/>
+          </a:xfrm>
+          <a:prstGeom prst="straightConnector1">
+            <a:avLst/>
+          </a:prstGeom>
+          <a:ln w="38100">
+            <a:solidFill>
+              <a:schemeClr val="tx1"/>
+            </a:solidFill>
+            <a:tailEnd type="triangle"/>
+          </a:ln>
+        </p:spPr>
+        <p:style>
+          <a:lnRef idx="1">
+            <a:schemeClr val="accent1"/>
+          </a:lnRef>
+          <a:fillRef idx="0">
+            <a:schemeClr val="accent1"/>
+          </a:fillRef>
+          <a:effectRef idx="0">
+            <a:schemeClr val="accent1"/>
+          </a:effectRef>
+          <a:fontRef idx="minor">
+            <a:schemeClr val="tx1"/>
+          </a:fontRef>
+        </p:style>
+      </p:cxnSp>
+    </p:spTree>
+    <p:extLst>
+      <p:ext uri="{BB962C8B-B14F-4D97-AF65-F5344CB8AC3E}">
+        <p14:creationId xmlns:p14="http://schemas.microsoft.com/office/powerpoint/2010/main" val="3607756165"/>
       </p:ext>
     </p:extLst>
   </p:cSld>
@@ -3809,4 +5439,299 @@
     </a:ext>
   </a:extLst>
 </a:theme>
+</file>
+
+<file path=ppt/theme/theme2.xml><?xml version="1.0" encoding="utf-8"?>
+<a:theme xmlns:a="http://schemas.openxmlformats.org/drawingml/2006/main" name="Office Theme">
+  <a:themeElements>
+    <a:clrScheme name="Office">
+      <a:dk1>
+        <a:sysClr val="windowText" lastClr="000000"/>
+      </a:dk1>
+      <a:lt1>
+        <a:sysClr val="window" lastClr="FFFFFF"/>
+      </a:lt1>
+      <a:dk2>
+        <a:srgbClr val="44546A"/>
+      </a:dk2>
+      <a:lt2>
+        <a:srgbClr val="E7E6E6"/>
+      </a:lt2>
+      <a:accent1>
+        <a:srgbClr val="4472C4"/>
+      </a:accent1>
+      <a:accent2>
+        <a:srgbClr val="ED7D31"/>
+      </a:accent2>
+      <a:accent3>
+        <a:srgbClr val="A5A5A5"/>
+      </a:accent3>
+      <a:accent4>
+        <a:srgbClr val="FFC000"/>
+      </a:accent4>
+      <a:accent5>
+        <a:srgbClr val="5B9BD5"/>
+      </a:accent5>
+      <a:accent6>
+        <a:srgbClr val="70AD47"/>
+      </a:accent6>
+      <a:hlink>
+        <a:srgbClr val="0563C1"/>
+      </a:hlink>
+      <a:folHlink>
+        <a:srgbClr val="954F72"/>
+      </a:folHlink>
+    </a:clrScheme>
+    <a:fontScheme name="Office">
+      <a:majorFont>
+        <a:latin typeface="Calibri Light" panose="020F0302020204030204"/>
+        <a:ea typeface=""/>
+        <a:cs typeface=""/>
+        <a:font script="Jpan" typeface="游ゴシック Light"/>
+        <a:font script="Hang" typeface="맑은 고딕"/>
+        <a:font script="Hans" typeface="等线 Light"/>
+        <a:font script="Hant" typeface="新細明體"/>
+        <a:font script="Arab" typeface="Times New Roman"/>
+        <a:font script="Hebr" typeface="Times New Roman"/>
+        <a:font script="Thai" typeface="Angsana New"/>
+        <a:font script="Ethi" typeface="Nyala"/>
+        <a:font script="Beng" typeface="Vrinda"/>
+        <a:font script="Gujr" typeface="Shruti"/>
+        <a:font script="Khmr" typeface="MoolBoran"/>
+        <a:font script="Knda" typeface="Tunga"/>
+        <a:font script="Guru" typeface="Raavi"/>
+        <a:font script="Cans" typeface="Euphemia"/>
+        <a:font script="Cher" typeface="Plantagenet Cherokee"/>
+        <a:font script="Yiii" typeface="Microsoft Yi Baiti"/>
+        <a:font script="Tibt" typeface="Microsoft Himalaya"/>
+        <a:font script="Thaa" typeface="MV Boli"/>
+        <a:font script="Deva" typeface="Mangal"/>
+        <a:font script="Telu" typeface="Gautami"/>
+        <a:font script="Taml" typeface="Latha"/>
+        <a:font script="Syrc" typeface="Estrangelo Edessa"/>
+        <a:font script="Orya" typeface="Kalinga"/>
+        <a:font script="Mlym" typeface="Kartika"/>
+        <a:font script="Laoo" typeface="DokChampa"/>
+        <a:font script="Sinh" typeface="Iskoola Pota"/>
+        <a:font script="Mong" typeface="Mongolian Baiti"/>
+        <a:font script="Viet" typeface="Times New Roman"/>
+        <a:font script="Uigh" typeface="Microsoft Uighur"/>
+        <a:font script="Geor" typeface="Sylfaen"/>
+        <a:font script="Armn" typeface="Arial"/>
+        <a:font script="Bugi" typeface="Leelawadee UI"/>
+        <a:font script="Bopo" typeface="Microsoft JhengHei"/>
+        <a:font script="Java" typeface="Javanese Text"/>
+        <a:font script="Lisu" typeface="Segoe UI"/>
+        <a:font script="Mymr" typeface="Myanmar Text"/>
+        <a:font script="Nkoo" typeface="Ebrima"/>
+        <a:font script="Olck" typeface="Nirmala UI"/>
+        <a:font script="Osma" typeface="Ebrima"/>
+        <a:font script="Phag" typeface="Phagspa"/>
+        <a:font script="Syrn" typeface="Estrangelo Edessa"/>
+        <a:font script="Syrj" typeface="Estrangelo Edessa"/>
+        <a:font script="Syre" typeface="Estrangelo Edessa"/>
+        <a:font script="Sora" typeface="Nirmala UI"/>
+        <a:font script="Tale" typeface="Microsoft Tai Le"/>
+        <a:font script="Talu" typeface="Microsoft New Tai Lue"/>
+        <a:font script="Tfng" typeface="Ebrima"/>
+      </a:majorFont>
+      <a:minorFont>
+        <a:latin typeface="Calibri" panose="020F0502020204030204"/>
+        <a:ea typeface=""/>
+        <a:cs typeface=""/>
+        <a:font script="Jpan" typeface="游ゴシック"/>
+        <a:font script="Hang" typeface="맑은 고딕"/>
+        <a:font script="Hans" typeface="等线"/>
+        <a:font script="Hant" typeface="新細明體"/>
+        <a:font script="Arab" typeface="Arial"/>
+        <a:font script="Hebr" typeface="Arial"/>
+        <a:font script="Thai" typeface="Cordia New"/>
+        <a:font script="Ethi" typeface="Nyala"/>
+        <a:font script="Beng" typeface="Vrinda"/>
+        <a:font script="Gujr" typeface="Shruti"/>
+        <a:font script="Khmr" typeface="DaunPenh"/>
+        <a:font script="Knda" typeface="Tunga"/>
+        <a:font script="Guru" typeface="Raavi"/>
+        <a:font script="Cans" typeface="Euphemia"/>
+        <a:font script="Cher" typeface="Plantagenet Cherokee"/>
+        <a:font script="Yiii" typeface="Microsoft Yi Baiti"/>
+        <a:font script="Tibt" typeface="Microsoft Himalaya"/>
+        <a:font script="Thaa" typeface="MV Boli"/>
+        <a:font script="Deva" typeface="Mangal"/>
+        <a:font script="Telu" typeface="Gautami"/>
+        <a:font script="Taml" typeface="Latha"/>
+        <a:font script="Syrc" typeface="Estrangelo Edessa"/>
+        <a:font script="Orya" typeface="Kalinga"/>
+        <a:font script="Mlym" typeface="Kartika"/>
+        <a:font script="Laoo" typeface="DokChampa"/>
+        <a:font script="Sinh" typeface="Iskoola Pota"/>
+        <a:font script="Mong" typeface="Mongolian Baiti"/>
+        <a:font script="Viet" typeface="Arial"/>
+        <a:font script="Uigh" typeface="Microsoft Uighur"/>
+        <a:font script="Geor" typeface="Sylfaen"/>
+        <a:font script="Armn" typeface="Arial"/>
+        <a:font script="Bugi" typeface="Leelawadee UI"/>
+        <a:font script="Bopo" typeface="Microsoft JhengHei"/>
+        <a:font script="Java" typeface="Javanese Text"/>
+        <a:font script="Lisu" typeface="Segoe UI"/>
+        <a:font script="Mymr" typeface="Myanmar Text"/>
+        <a:font script="Nkoo" typeface="Ebrima"/>
+        <a:font script="Olck" typeface="Nirmala UI"/>
+        <a:font script="Osma" typeface="Ebrima"/>
+        <a:font script="Phag" typeface="Phagspa"/>
+        <a:font script="Syrn" typeface="Estrangelo Edessa"/>
+        <a:font script="Syrj" typeface="Estrangelo Edessa"/>
+        <a:font script="Syre" typeface="Estrangelo Edessa"/>
+        <a:font script="Sora" typeface="Nirmala UI"/>
+        <a:font script="Tale" typeface="Microsoft Tai Le"/>
+        <a:font script="Talu" typeface="Microsoft New Tai Lue"/>
+        <a:font script="Tfng" typeface="Ebrima"/>
+      </a:minorFont>
+    </a:fontScheme>
+    <a:fmtScheme name="Office">
+      <a:fillStyleLst>
+        <a:solidFill>
+          <a:schemeClr val="phClr"/>
+        </a:solidFill>
+        <a:gradFill rotWithShape="1">
+          <a:gsLst>
+            <a:gs pos="0">
+              <a:schemeClr val="phClr">
+                <a:lumMod val="110000"/>
+                <a:satMod val="105000"/>
+                <a:tint val="67000"/>
+              </a:schemeClr>
+            </a:gs>
+            <a:gs pos="50000">
+              <a:schemeClr val="phClr">
+                <a:lumMod val="105000"/>
+                <a:satMod val="103000"/>
+                <a:tint val="73000"/>
+              </a:schemeClr>
+            </a:gs>
+            <a:gs pos="100000">
+              <a:schemeClr val="phClr">
+                <a:lumMod val="105000"/>
+                <a:satMod val="109000"/>
+                <a:tint val="81000"/>
+              </a:schemeClr>
+            </a:gs>
+          </a:gsLst>
+          <a:lin ang="5400000" scaled="0"/>
+        </a:gradFill>
+        <a:gradFill rotWithShape="1">
+          <a:gsLst>
+            <a:gs pos="0">
+              <a:schemeClr val="phClr">
+                <a:satMod val="103000"/>
+                <a:lumMod val="102000"/>
+                <a:tint val="94000"/>
+              </a:schemeClr>
+            </a:gs>
+            <a:gs pos="50000">
+              <a:schemeClr val="phClr">
+                <a:satMod val="110000"/>
+                <a:lumMod val="100000"/>
+                <a:shade val="100000"/>
+              </a:schemeClr>
+            </a:gs>
+            <a:gs pos="100000">
+              <a:schemeClr val="phClr">
+                <a:lumMod val="99000"/>
+                <a:satMod val="120000"/>
+                <a:shade val="78000"/>
+              </a:schemeClr>
+            </a:gs>
+          </a:gsLst>
+          <a:lin ang="5400000" scaled="0"/>
+        </a:gradFill>
+      </a:fillStyleLst>
+      <a:lnStyleLst>
+        <a:ln w="6350" cap="flat" cmpd="sng" algn="ctr">
+          <a:solidFill>
+            <a:schemeClr val="phClr"/>
+          </a:solidFill>
+          <a:prstDash val="solid"/>
+          <a:miter lim="800000"/>
+        </a:ln>
+        <a:ln w="12700" cap="flat" cmpd="sng" algn="ctr">
+          <a:solidFill>
+            <a:schemeClr val="phClr"/>
+          </a:solidFill>
+          <a:prstDash val="solid"/>
+          <a:miter lim="800000"/>
+        </a:ln>
+        <a:ln w="19050" cap="flat" cmpd="sng" algn="ctr">
+          <a:solidFill>
+            <a:schemeClr val="phClr"/>
+          </a:solidFill>
+          <a:prstDash val="solid"/>
+          <a:miter lim="800000"/>
+        </a:ln>
+      </a:lnStyleLst>
+      <a:effectStyleLst>
+        <a:effectStyle>
+          <a:effectLst/>
+        </a:effectStyle>
+        <a:effectStyle>
+          <a:effectLst/>
+        </a:effectStyle>
+        <a:effectStyle>
+          <a:effectLst>
+            <a:outerShdw blurRad="57150" dist="19050" dir="5400000" algn="ctr" rotWithShape="0">
+              <a:srgbClr val="000000">
+                <a:alpha val="63000"/>
+              </a:srgbClr>
+            </a:outerShdw>
+          </a:effectLst>
+        </a:effectStyle>
+      </a:effectStyleLst>
+      <a:bgFillStyleLst>
+        <a:solidFill>
+          <a:schemeClr val="phClr"/>
+        </a:solidFill>
+        <a:solidFill>
+          <a:schemeClr val="phClr">
+            <a:tint val="95000"/>
+            <a:satMod val="170000"/>
+          </a:schemeClr>
+        </a:solidFill>
+        <a:gradFill rotWithShape="1">
+          <a:gsLst>
+            <a:gs pos="0">
+              <a:schemeClr val="phClr">
+                <a:tint val="93000"/>
+                <a:satMod val="150000"/>
+                <a:shade val="98000"/>
+                <a:lumMod val="102000"/>
+              </a:schemeClr>
+            </a:gs>
+            <a:gs pos="50000">
+              <a:schemeClr val="phClr">
+                <a:tint val="98000"/>
+                <a:satMod val="130000"/>
+                <a:shade val="90000"/>
+                <a:lumMod val="103000"/>
+              </a:schemeClr>
+            </a:gs>
+            <a:gs pos="100000">
+              <a:schemeClr val="phClr">
+                <a:shade val="63000"/>
+                <a:satMod val="120000"/>
+              </a:schemeClr>
+            </a:gs>
+          </a:gsLst>
+          <a:lin ang="5400000" scaled="0"/>
+        </a:gradFill>
+      </a:bgFillStyleLst>
+    </a:fmtScheme>
+  </a:themeElements>
+  <a:objectDefaults/>
+  <a:extraClrSchemeLst/>
+  <a:extLst>
+    <a:ext uri="{05A4C25C-085E-4340-85A3-A5531E510DB2}">
+      <thm15:themeFamily xmlns:thm15="http://schemas.microsoft.com/office/thememl/2012/main" name="Office Theme" id="{62F939B6-93AF-4DB8-9C6B-D6C7DFDC589F}" vid="{4A3C46E8-61CC-4603-A589-7422A47A8E4A}"/>
+    </a:ext>
+  </a:extLst>
+</a:theme>
 </file>
</xml_diff>

<commit_message>
project report update - draft done for Functional Description, Evaluation and Discussion sections
</commit_message>
<xml_diff>
--- a/sketch/Sketch.pptx
+++ b/sketch/Sketch.pptx
@@ -218,7 +218,7 @@
           <a:p>
             <a:fld id="{5470FFE9-BA39-7D4F-9FAB-1D0BBF9503AD}" type="datetimeFigureOut">
               <a:rPr lang="en-GB" smtClean="0"/>
-              <a:t>13/11/2022</a:t>
+              <a:t>14/11/2022</a:t>
             </a:fld>
             <a:endParaRPr lang="en-GB"/>
           </a:p>
@@ -716,7 +716,7 @@
           <a:p>
             <a:fld id="{DFC86FF5-A993-5E46-9D0C-47E0F533B519}" type="datetimeFigureOut">
               <a:rPr lang="en-GB" smtClean="0"/>
-              <a:t>13/11/2022</a:t>
+              <a:t>14/11/2022</a:t>
             </a:fld>
             <a:endParaRPr lang="en-GB"/>
           </a:p>
@@ -914,7 +914,7 @@
           <a:p>
             <a:fld id="{DFC86FF5-A993-5E46-9D0C-47E0F533B519}" type="datetimeFigureOut">
               <a:rPr lang="en-GB" smtClean="0"/>
-              <a:t>13/11/2022</a:t>
+              <a:t>14/11/2022</a:t>
             </a:fld>
             <a:endParaRPr lang="en-GB"/>
           </a:p>
@@ -1122,7 +1122,7 @@
           <a:p>
             <a:fld id="{DFC86FF5-A993-5E46-9D0C-47E0F533B519}" type="datetimeFigureOut">
               <a:rPr lang="en-GB" smtClean="0"/>
-              <a:t>13/11/2022</a:t>
+              <a:t>14/11/2022</a:t>
             </a:fld>
             <a:endParaRPr lang="en-GB"/>
           </a:p>
@@ -1320,7 +1320,7 @@
           <a:p>
             <a:fld id="{DFC86FF5-A993-5E46-9D0C-47E0F533B519}" type="datetimeFigureOut">
               <a:rPr lang="en-GB" smtClean="0"/>
-              <a:t>13/11/2022</a:t>
+              <a:t>14/11/2022</a:t>
             </a:fld>
             <a:endParaRPr lang="en-GB"/>
           </a:p>
@@ -1595,7 +1595,7 @@
           <a:p>
             <a:fld id="{DFC86FF5-A993-5E46-9D0C-47E0F533B519}" type="datetimeFigureOut">
               <a:rPr lang="en-GB" smtClean="0"/>
-              <a:t>13/11/2022</a:t>
+              <a:t>14/11/2022</a:t>
             </a:fld>
             <a:endParaRPr lang="en-GB"/>
           </a:p>
@@ -1860,7 +1860,7 @@
           <a:p>
             <a:fld id="{DFC86FF5-A993-5E46-9D0C-47E0F533B519}" type="datetimeFigureOut">
               <a:rPr lang="en-GB" smtClean="0"/>
-              <a:t>13/11/2022</a:t>
+              <a:t>14/11/2022</a:t>
             </a:fld>
             <a:endParaRPr lang="en-GB"/>
           </a:p>
@@ -2272,7 +2272,7 @@
           <a:p>
             <a:fld id="{DFC86FF5-A993-5E46-9D0C-47E0F533B519}" type="datetimeFigureOut">
               <a:rPr lang="en-GB" smtClean="0"/>
-              <a:t>13/11/2022</a:t>
+              <a:t>14/11/2022</a:t>
             </a:fld>
             <a:endParaRPr lang="en-GB"/>
           </a:p>
@@ -2413,7 +2413,7 @@
           <a:p>
             <a:fld id="{DFC86FF5-A993-5E46-9D0C-47E0F533B519}" type="datetimeFigureOut">
               <a:rPr lang="en-GB" smtClean="0"/>
-              <a:t>13/11/2022</a:t>
+              <a:t>14/11/2022</a:t>
             </a:fld>
             <a:endParaRPr lang="en-GB"/>
           </a:p>
@@ -2526,7 +2526,7 @@
           <a:p>
             <a:fld id="{DFC86FF5-A993-5E46-9D0C-47E0F533B519}" type="datetimeFigureOut">
               <a:rPr lang="en-GB" smtClean="0"/>
-              <a:t>13/11/2022</a:t>
+              <a:t>14/11/2022</a:t>
             </a:fld>
             <a:endParaRPr lang="en-GB"/>
           </a:p>
@@ -2837,7 +2837,7 @@
           <a:p>
             <a:fld id="{DFC86FF5-A993-5E46-9D0C-47E0F533B519}" type="datetimeFigureOut">
               <a:rPr lang="en-GB" smtClean="0"/>
-              <a:t>13/11/2022</a:t>
+              <a:t>14/11/2022</a:t>
             </a:fld>
             <a:endParaRPr lang="en-GB"/>
           </a:p>
@@ -3125,7 +3125,7 @@
           <a:p>
             <a:fld id="{DFC86FF5-A993-5E46-9D0C-47E0F533B519}" type="datetimeFigureOut">
               <a:rPr lang="en-GB" smtClean="0"/>
-              <a:t>13/11/2022</a:t>
+              <a:t>14/11/2022</a:t>
             </a:fld>
             <a:endParaRPr lang="en-GB"/>
           </a:p>
@@ -3366,7 +3366,7 @@
           <a:p>
             <a:fld id="{DFC86FF5-A993-5E46-9D0C-47E0F533B519}" type="datetimeFigureOut">
               <a:rPr lang="en-GB" smtClean="0"/>
-              <a:t>13/11/2022</a:t>
+              <a:t>14/11/2022</a:t>
             </a:fld>
             <a:endParaRPr lang="en-GB"/>
           </a:p>

</xml_diff>

<commit_message>
add/update sketches and flow diagrams
</commit_message>
<xml_diff>
--- a/sketch/Sketch.pptx
+++ b/sketch/Sketch.pptx
@@ -5,7 +5,7 @@
     <p:sldMasterId id="2147483648" r:id="rId1"/>
   </p:sldMasterIdLst>
   <p:notesMasterIdLst>
-    <p:notesMasterId r:id="rId8"/>
+    <p:notesMasterId r:id="rId9"/>
   </p:notesMasterIdLst>
   <p:sldIdLst>
     <p:sldId id="256" r:id="rId2"/>
@@ -14,6 +14,7 @@
     <p:sldId id="259" r:id="rId5"/>
     <p:sldId id="261" r:id="rId6"/>
     <p:sldId id="260" r:id="rId7"/>
+    <p:sldId id="262" r:id="rId8"/>
   </p:sldIdLst>
   <p:sldSz cx="12192000" cy="6858000"/>
   <p:notesSz cx="6858000" cy="9144000"/>
@@ -127,6 +128,7 @@
         <p14:section name="Report Sketches" id="{721E4A37-1560-6E40-986D-BC540B8153ED}">
           <p14:sldIdLst>
             <p14:sldId id="260"/>
+            <p14:sldId id="262"/>
           </p14:sldIdLst>
         </p14:section>
       </p14:sectionLst>
@@ -220,7 +222,7 @@
           <a:p>
             <a:fld id="{5470FFE9-BA39-7D4F-9FAB-1D0BBF9503AD}" type="datetimeFigureOut">
               <a:rPr lang="en-GB" smtClean="0"/>
-              <a:t>14/11/2022</a:t>
+              <a:t>09/12/2022</a:t>
             </a:fld>
             <a:endParaRPr lang="en-GB"/>
           </a:p>
@@ -718,7 +720,7 @@
           <a:p>
             <a:fld id="{DFC86FF5-A993-5E46-9D0C-47E0F533B519}" type="datetimeFigureOut">
               <a:rPr lang="en-GB" smtClean="0"/>
-              <a:t>14/11/2022</a:t>
+              <a:t>09/12/2022</a:t>
             </a:fld>
             <a:endParaRPr lang="en-GB"/>
           </a:p>
@@ -916,7 +918,7 @@
           <a:p>
             <a:fld id="{DFC86FF5-A993-5E46-9D0C-47E0F533B519}" type="datetimeFigureOut">
               <a:rPr lang="en-GB" smtClean="0"/>
-              <a:t>14/11/2022</a:t>
+              <a:t>09/12/2022</a:t>
             </a:fld>
             <a:endParaRPr lang="en-GB"/>
           </a:p>
@@ -1124,7 +1126,7 @@
           <a:p>
             <a:fld id="{DFC86FF5-A993-5E46-9D0C-47E0F533B519}" type="datetimeFigureOut">
               <a:rPr lang="en-GB" smtClean="0"/>
-              <a:t>14/11/2022</a:t>
+              <a:t>09/12/2022</a:t>
             </a:fld>
             <a:endParaRPr lang="en-GB"/>
           </a:p>
@@ -1322,7 +1324,7 @@
           <a:p>
             <a:fld id="{DFC86FF5-A993-5E46-9D0C-47E0F533B519}" type="datetimeFigureOut">
               <a:rPr lang="en-GB" smtClean="0"/>
-              <a:t>14/11/2022</a:t>
+              <a:t>09/12/2022</a:t>
             </a:fld>
             <a:endParaRPr lang="en-GB"/>
           </a:p>
@@ -1597,7 +1599,7 @@
           <a:p>
             <a:fld id="{DFC86FF5-A993-5E46-9D0C-47E0F533B519}" type="datetimeFigureOut">
               <a:rPr lang="en-GB" smtClean="0"/>
-              <a:t>14/11/2022</a:t>
+              <a:t>09/12/2022</a:t>
             </a:fld>
             <a:endParaRPr lang="en-GB"/>
           </a:p>
@@ -1862,7 +1864,7 @@
           <a:p>
             <a:fld id="{DFC86FF5-A993-5E46-9D0C-47E0F533B519}" type="datetimeFigureOut">
               <a:rPr lang="en-GB" smtClean="0"/>
-              <a:t>14/11/2022</a:t>
+              <a:t>09/12/2022</a:t>
             </a:fld>
             <a:endParaRPr lang="en-GB"/>
           </a:p>
@@ -2274,7 +2276,7 @@
           <a:p>
             <a:fld id="{DFC86FF5-A993-5E46-9D0C-47E0F533B519}" type="datetimeFigureOut">
               <a:rPr lang="en-GB" smtClean="0"/>
-              <a:t>14/11/2022</a:t>
+              <a:t>09/12/2022</a:t>
             </a:fld>
             <a:endParaRPr lang="en-GB"/>
           </a:p>
@@ -2415,7 +2417,7 @@
           <a:p>
             <a:fld id="{DFC86FF5-A993-5E46-9D0C-47E0F533B519}" type="datetimeFigureOut">
               <a:rPr lang="en-GB" smtClean="0"/>
-              <a:t>14/11/2022</a:t>
+              <a:t>09/12/2022</a:t>
             </a:fld>
             <a:endParaRPr lang="en-GB"/>
           </a:p>
@@ -2528,7 +2530,7 @@
           <a:p>
             <a:fld id="{DFC86FF5-A993-5E46-9D0C-47E0F533B519}" type="datetimeFigureOut">
               <a:rPr lang="en-GB" smtClean="0"/>
-              <a:t>14/11/2022</a:t>
+              <a:t>09/12/2022</a:t>
             </a:fld>
             <a:endParaRPr lang="en-GB"/>
           </a:p>
@@ -2839,7 +2841,7 @@
           <a:p>
             <a:fld id="{DFC86FF5-A993-5E46-9D0C-47E0F533B519}" type="datetimeFigureOut">
               <a:rPr lang="en-GB" smtClean="0"/>
-              <a:t>14/11/2022</a:t>
+              <a:t>09/12/2022</a:t>
             </a:fld>
             <a:endParaRPr lang="en-GB"/>
           </a:p>
@@ -3127,7 +3129,7 @@
           <a:p>
             <a:fld id="{DFC86FF5-A993-5E46-9D0C-47E0F533B519}" type="datetimeFigureOut">
               <a:rPr lang="en-GB" smtClean="0"/>
-              <a:t>14/11/2022</a:t>
+              <a:t>09/12/2022</a:t>
             </a:fld>
             <a:endParaRPr lang="en-GB"/>
           </a:p>
@@ -3368,7 +3370,7 @@
           <a:p>
             <a:fld id="{DFC86FF5-A993-5E46-9D0C-47E0F533B519}" type="datetimeFigureOut">
               <a:rPr lang="en-GB" smtClean="0"/>
-              <a:t>14/11/2022</a:t>
+              <a:t>09/12/2022</a:t>
             </a:fld>
             <a:endParaRPr lang="en-GB"/>
           </a:p>
@@ -5216,6 +5218,2298 @@
     <p:extLst>
       <p:ext uri="{BB962C8B-B14F-4D97-AF65-F5344CB8AC3E}">
         <p14:creationId xmlns:p14="http://schemas.microsoft.com/office/powerpoint/2010/main" val="3607756165"/>
+      </p:ext>
+    </p:extLst>
+  </p:cSld>
+  <p:clrMapOvr>
+    <a:masterClrMapping/>
+  </p:clrMapOvr>
+</p:sld>
+</file>
+
+<file path=ppt/slides/slide7.xml><?xml version="1.0" encoding="utf-8"?>
+<p:sld xmlns:a="http://schemas.openxmlformats.org/drawingml/2006/main" xmlns:r="http://schemas.openxmlformats.org/officeDocument/2006/relationships" xmlns:p="http://schemas.openxmlformats.org/presentationml/2006/main">
+  <p:cSld>
+    <p:spTree>
+      <p:nvGrpSpPr>
+        <p:cNvPr id="1" name=""/>
+        <p:cNvGrpSpPr/>
+        <p:nvPr/>
+      </p:nvGrpSpPr>
+      <p:grpSpPr>
+        <a:xfrm>
+          <a:off x="0" y="0"/>
+          <a:ext cx="0" cy="0"/>
+          <a:chOff x="0" y="0"/>
+          <a:chExt cx="0" cy="0"/>
+        </a:xfrm>
+      </p:grpSpPr>
+      <p:sp>
+        <p:nvSpPr>
+          <p:cNvPr id="99" name="Oval 98">
+            <a:extLst>
+              <a:ext uri="{FF2B5EF4-FFF2-40B4-BE49-F238E27FC236}">
+                <a16:creationId xmlns:a16="http://schemas.microsoft.com/office/drawing/2014/main" id="{926909D1-9118-909C-C877-C3E0E7B90B51}"/>
+              </a:ext>
+            </a:extLst>
+          </p:cNvPr>
+          <p:cNvSpPr/>
+          <p:nvPr/>
+        </p:nvSpPr>
+        <p:spPr>
+          <a:xfrm>
+            <a:off x="4685571" y="5051358"/>
+            <a:ext cx="838217" cy="817778"/>
+          </a:xfrm>
+          <a:prstGeom prst="ellipse">
+            <a:avLst/>
+          </a:prstGeom>
+          <a:solidFill>
+            <a:schemeClr val="accent2">
+              <a:lumMod val="20000"/>
+              <a:lumOff val="80000"/>
+            </a:schemeClr>
+          </a:solidFill>
+          <a:ln w="25400">
+            <a:solidFill>
+              <a:srgbClr val="FF0000"/>
+            </a:solidFill>
+          </a:ln>
+        </p:spPr>
+        <p:style>
+          <a:lnRef idx="2">
+            <a:schemeClr val="accent1">
+              <a:shade val="50000"/>
+            </a:schemeClr>
+          </a:lnRef>
+          <a:fillRef idx="1">
+            <a:schemeClr val="accent1"/>
+          </a:fillRef>
+          <a:effectRef idx="0">
+            <a:schemeClr val="accent1"/>
+          </a:effectRef>
+          <a:fontRef idx="minor">
+            <a:schemeClr val="lt1"/>
+          </a:fontRef>
+        </p:style>
+        <p:txBody>
+          <a:bodyPr rtlCol="0" anchor="ctr"/>
+          <a:lstStyle/>
+          <a:p>
+            <a:pPr algn="ctr"/>
+            <a:endParaRPr lang="en-GB"/>
+          </a:p>
+        </p:txBody>
+      </p:sp>
+      <p:sp>
+        <p:nvSpPr>
+          <p:cNvPr id="98" name="Oval 97">
+            <a:extLst>
+              <a:ext uri="{FF2B5EF4-FFF2-40B4-BE49-F238E27FC236}">
+                <a16:creationId xmlns:a16="http://schemas.microsoft.com/office/drawing/2014/main" id="{94A2253D-B3DD-667B-DD1B-D1151011CE2B}"/>
+              </a:ext>
+            </a:extLst>
+          </p:cNvPr>
+          <p:cNvSpPr/>
+          <p:nvPr/>
+        </p:nvSpPr>
+        <p:spPr>
+          <a:xfrm>
+            <a:off x="6294945" y="5034634"/>
+            <a:ext cx="838217" cy="817778"/>
+          </a:xfrm>
+          <a:prstGeom prst="ellipse">
+            <a:avLst/>
+          </a:prstGeom>
+          <a:solidFill>
+            <a:schemeClr val="accent1">
+              <a:lumMod val="20000"/>
+              <a:lumOff val="80000"/>
+            </a:schemeClr>
+          </a:solidFill>
+          <a:ln w="25400"/>
+        </p:spPr>
+        <p:style>
+          <a:lnRef idx="2">
+            <a:schemeClr val="accent1">
+              <a:shade val="50000"/>
+            </a:schemeClr>
+          </a:lnRef>
+          <a:fillRef idx="1">
+            <a:schemeClr val="accent1"/>
+          </a:fillRef>
+          <a:effectRef idx="0">
+            <a:schemeClr val="accent1"/>
+          </a:effectRef>
+          <a:fontRef idx="minor">
+            <a:schemeClr val="lt1"/>
+          </a:fontRef>
+        </p:style>
+        <p:txBody>
+          <a:bodyPr rtlCol="0" anchor="ctr"/>
+          <a:lstStyle/>
+          <a:p>
+            <a:pPr algn="ctr"/>
+            <a:endParaRPr lang="en-GB"/>
+          </a:p>
+        </p:txBody>
+      </p:sp>
+      <p:sp>
+        <p:nvSpPr>
+          <p:cNvPr id="97" name="Oval 96">
+            <a:extLst>
+              <a:ext uri="{FF2B5EF4-FFF2-40B4-BE49-F238E27FC236}">
+                <a16:creationId xmlns:a16="http://schemas.microsoft.com/office/drawing/2014/main" id="{CE12DF59-ABC0-6EAD-590C-165DA11E0169}"/>
+              </a:ext>
+            </a:extLst>
+          </p:cNvPr>
+          <p:cNvSpPr/>
+          <p:nvPr/>
+        </p:nvSpPr>
+        <p:spPr>
+          <a:xfrm>
+            <a:off x="5327878" y="4500080"/>
+            <a:ext cx="838217" cy="817778"/>
+          </a:xfrm>
+          <a:prstGeom prst="ellipse">
+            <a:avLst/>
+          </a:prstGeom>
+          <a:solidFill>
+            <a:schemeClr val="accent6">
+              <a:lumMod val="20000"/>
+              <a:lumOff val="80000"/>
+            </a:schemeClr>
+          </a:solidFill>
+          <a:ln w="25400">
+            <a:solidFill>
+              <a:srgbClr val="00B050"/>
+            </a:solidFill>
+          </a:ln>
+        </p:spPr>
+        <p:style>
+          <a:lnRef idx="2">
+            <a:schemeClr val="accent1">
+              <a:shade val="50000"/>
+            </a:schemeClr>
+          </a:lnRef>
+          <a:fillRef idx="1">
+            <a:schemeClr val="accent1"/>
+          </a:fillRef>
+          <a:effectRef idx="0">
+            <a:schemeClr val="accent1"/>
+          </a:effectRef>
+          <a:fontRef idx="minor">
+            <a:schemeClr val="lt1"/>
+          </a:fontRef>
+        </p:style>
+        <p:txBody>
+          <a:bodyPr rtlCol="0" anchor="ctr"/>
+          <a:lstStyle/>
+          <a:p>
+            <a:pPr algn="ctr"/>
+            <a:endParaRPr lang="en-GB"/>
+          </a:p>
+        </p:txBody>
+      </p:sp>
+      <p:grpSp>
+        <p:nvGrpSpPr>
+          <p:cNvPr id="71" name="Group 70">
+            <a:extLst>
+              <a:ext uri="{FF2B5EF4-FFF2-40B4-BE49-F238E27FC236}">
+                <a16:creationId xmlns:a16="http://schemas.microsoft.com/office/drawing/2014/main" id="{193882DA-75C8-70A1-F99E-A948178086DD}"/>
+              </a:ext>
+            </a:extLst>
+          </p:cNvPr>
+          <p:cNvGrpSpPr/>
+          <p:nvPr/>
+        </p:nvGrpSpPr>
+        <p:grpSpPr>
+          <a:xfrm>
+            <a:off x="1628634" y="364679"/>
+            <a:ext cx="7593587" cy="2806830"/>
+            <a:chOff x="1606454" y="702779"/>
+            <a:chExt cx="7593587" cy="2806830"/>
+          </a:xfrm>
+        </p:grpSpPr>
+        <p:sp>
+          <p:nvSpPr>
+            <p:cNvPr id="5" name="Rounded Rectangle 4">
+              <a:extLst>
+                <a:ext uri="{FF2B5EF4-FFF2-40B4-BE49-F238E27FC236}">
+                  <a16:creationId xmlns:a16="http://schemas.microsoft.com/office/drawing/2014/main" id="{4364561C-5275-BE2C-AF15-D274D5C35735}"/>
+                </a:ext>
+              </a:extLst>
+            </p:cNvPr>
+            <p:cNvSpPr/>
+            <p:nvPr/>
+          </p:nvSpPr>
+          <p:spPr>
+            <a:xfrm>
+              <a:off x="4390161" y="1366447"/>
+              <a:ext cx="2879835" cy="1450428"/>
+            </a:xfrm>
+            <a:prstGeom prst="roundRect">
+              <a:avLst/>
+            </a:prstGeom>
+            <a:noFill/>
+            <a:ln w="38100">
+              <a:solidFill>
+                <a:schemeClr val="tx1"/>
+              </a:solidFill>
+            </a:ln>
+          </p:spPr>
+          <p:style>
+            <a:lnRef idx="2">
+              <a:schemeClr val="accent1">
+                <a:shade val="50000"/>
+              </a:schemeClr>
+            </a:lnRef>
+            <a:fillRef idx="1">
+              <a:schemeClr val="accent1"/>
+            </a:fillRef>
+            <a:effectRef idx="0">
+              <a:schemeClr val="accent1"/>
+            </a:effectRef>
+            <a:fontRef idx="minor">
+              <a:schemeClr val="lt1"/>
+            </a:fontRef>
+          </p:style>
+          <p:txBody>
+            <a:bodyPr rtlCol="0" anchor="ctr"/>
+            <a:lstStyle/>
+            <a:p>
+              <a:pPr algn="ctr"/>
+              <a:endParaRPr lang="en-GB"/>
+            </a:p>
+          </p:txBody>
+        </p:sp>
+        <p:grpSp>
+          <p:nvGrpSpPr>
+            <p:cNvPr id="27" name="Group 26">
+              <a:extLst>
+                <a:ext uri="{FF2B5EF4-FFF2-40B4-BE49-F238E27FC236}">
+                  <a16:creationId xmlns:a16="http://schemas.microsoft.com/office/drawing/2014/main" id="{99DAE6E5-3854-91C6-1D9D-820EB549F0F8}"/>
+                </a:ext>
+              </a:extLst>
+            </p:cNvPr>
+            <p:cNvGrpSpPr/>
+            <p:nvPr/>
+          </p:nvGrpSpPr>
+          <p:grpSpPr>
+            <a:xfrm>
+              <a:off x="4825427" y="1801249"/>
+              <a:ext cx="2009302" cy="580823"/>
+              <a:chOff x="2604116" y="2968816"/>
+              <a:chExt cx="2009302" cy="580823"/>
+            </a:xfrm>
+          </p:grpSpPr>
+          <p:pic>
+            <p:nvPicPr>
+              <p:cNvPr id="10" name="Graphic 9">
+                <a:extLst>
+                  <a:ext uri="{FF2B5EF4-FFF2-40B4-BE49-F238E27FC236}">
+                    <a16:creationId xmlns:a16="http://schemas.microsoft.com/office/drawing/2014/main" id="{EDE13394-69C7-3697-FBEC-D2A922474AB2}"/>
+                  </a:ext>
+                </a:extLst>
+              </p:cNvPr>
+              <p:cNvPicPr>
+                <a:picLocks noChangeAspect="1"/>
+              </p:cNvPicPr>
+              <p:nvPr/>
+            </p:nvPicPr>
+            <p:blipFill>
+              <a:blip r:embed="rId2">
+                <a:extLst>
+                  <a:ext uri="{96DAC541-7B7A-43D3-8B79-37D633B846F1}">
+                    <asvg:svgBlip xmlns:asvg="http://schemas.microsoft.com/office/drawing/2016/SVG/main" r:embed="rId3"/>
+                  </a:ext>
+                </a:extLst>
+              </a:blip>
+              <a:stretch>
+                <a:fillRect/>
+              </a:stretch>
+            </p:blipFill>
+            <p:spPr>
+              <a:xfrm>
+                <a:off x="2604116" y="2973306"/>
+                <a:ext cx="502327" cy="574088"/>
+              </a:xfrm>
+              <a:prstGeom prst="rect">
+                <a:avLst/>
+              </a:prstGeom>
+            </p:spPr>
+          </p:pic>
+          <p:pic>
+            <p:nvPicPr>
+              <p:cNvPr id="18" name="Graphic 17">
+                <a:extLst>
+                  <a:ext uri="{FF2B5EF4-FFF2-40B4-BE49-F238E27FC236}">
+                    <a16:creationId xmlns:a16="http://schemas.microsoft.com/office/drawing/2014/main" id="{07561F1B-BE38-3E26-90F0-419011D7A707}"/>
+                  </a:ext>
+                </a:extLst>
+              </p:cNvPr>
+              <p:cNvPicPr>
+                <a:picLocks noChangeAspect="1"/>
+              </p:cNvPicPr>
+              <p:nvPr/>
+            </p:nvPicPr>
+            <p:blipFill>
+              <a:blip r:embed="rId2">
+                <a:extLst>
+                  <a:ext uri="{96DAC541-7B7A-43D3-8B79-37D633B846F1}">
+                    <asvg:svgBlip xmlns:asvg="http://schemas.microsoft.com/office/drawing/2016/SVG/main" r:embed="rId3"/>
+                  </a:ext>
+                </a:extLst>
+              </a:blip>
+              <a:stretch>
+                <a:fillRect/>
+              </a:stretch>
+            </p:blipFill>
+            <p:spPr>
+              <a:xfrm>
+                <a:off x="2855279" y="2973306"/>
+                <a:ext cx="502327" cy="574088"/>
+              </a:xfrm>
+              <a:prstGeom prst="rect">
+                <a:avLst/>
+              </a:prstGeom>
+            </p:spPr>
+          </p:pic>
+          <p:pic>
+            <p:nvPicPr>
+              <p:cNvPr id="19" name="Graphic 18">
+                <a:extLst>
+                  <a:ext uri="{FF2B5EF4-FFF2-40B4-BE49-F238E27FC236}">
+                    <a16:creationId xmlns:a16="http://schemas.microsoft.com/office/drawing/2014/main" id="{9692F98B-804B-AD38-3ED8-A0B77C1431DD}"/>
+                  </a:ext>
+                </a:extLst>
+              </p:cNvPr>
+              <p:cNvPicPr>
+                <a:picLocks noChangeAspect="1"/>
+              </p:cNvPicPr>
+              <p:nvPr/>
+            </p:nvPicPr>
+            <p:blipFill>
+              <a:blip r:embed="rId2">
+                <a:extLst>
+                  <a:ext uri="{96DAC541-7B7A-43D3-8B79-37D633B846F1}">
+                    <asvg:svgBlip xmlns:asvg="http://schemas.microsoft.com/office/drawing/2016/SVG/main" r:embed="rId3"/>
+                  </a:ext>
+                </a:extLst>
+              </a:blip>
+              <a:stretch>
+                <a:fillRect/>
+              </a:stretch>
+            </p:blipFill>
+            <p:spPr>
+              <a:xfrm>
+                <a:off x="3106442" y="2973306"/>
+                <a:ext cx="502327" cy="574088"/>
+              </a:xfrm>
+              <a:prstGeom prst="rect">
+                <a:avLst/>
+              </a:prstGeom>
+            </p:spPr>
+          </p:pic>
+          <p:pic>
+            <p:nvPicPr>
+              <p:cNvPr id="20" name="Graphic 19">
+                <a:extLst>
+                  <a:ext uri="{FF2B5EF4-FFF2-40B4-BE49-F238E27FC236}">
+                    <a16:creationId xmlns:a16="http://schemas.microsoft.com/office/drawing/2014/main" id="{70496610-58C0-2531-D606-80841857DB46}"/>
+                  </a:ext>
+                </a:extLst>
+              </p:cNvPr>
+              <p:cNvPicPr>
+                <a:picLocks noChangeAspect="1"/>
+              </p:cNvPicPr>
+              <p:nvPr/>
+            </p:nvPicPr>
+            <p:blipFill>
+              <a:blip r:embed="rId2">
+                <a:extLst>
+                  <a:ext uri="{96DAC541-7B7A-43D3-8B79-37D633B846F1}">
+                    <asvg:svgBlip xmlns:asvg="http://schemas.microsoft.com/office/drawing/2016/SVG/main" r:embed="rId3"/>
+                  </a:ext>
+                </a:extLst>
+              </a:blip>
+              <a:stretch>
+                <a:fillRect/>
+              </a:stretch>
+            </p:blipFill>
+            <p:spPr>
+              <a:xfrm>
+                <a:off x="3357605" y="2975551"/>
+                <a:ext cx="502327" cy="574088"/>
+              </a:xfrm>
+              <a:prstGeom prst="rect">
+                <a:avLst/>
+              </a:prstGeom>
+            </p:spPr>
+          </p:pic>
+          <p:pic>
+            <p:nvPicPr>
+              <p:cNvPr id="21" name="Graphic 20">
+                <a:extLst>
+                  <a:ext uri="{FF2B5EF4-FFF2-40B4-BE49-F238E27FC236}">
+                    <a16:creationId xmlns:a16="http://schemas.microsoft.com/office/drawing/2014/main" id="{2D82428B-229C-CEE5-0556-586743F55EDC}"/>
+                  </a:ext>
+                </a:extLst>
+              </p:cNvPr>
+              <p:cNvPicPr>
+                <a:picLocks noChangeAspect="1"/>
+              </p:cNvPicPr>
+              <p:nvPr/>
+            </p:nvPicPr>
+            <p:blipFill>
+              <a:blip r:embed="rId2">
+                <a:extLst>
+                  <a:ext uri="{96DAC541-7B7A-43D3-8B79-37D633B846F1}">
+                    <asvg:svgBlip xmlns:asvg="http://schemas.microsoft.com/office/drawing/2016/SVG/main" r:embed="rId3"/>
+                  </a:ext>
+                </a:extLst>
+              </a:blip>
+              <a:stretch>
+                <a:fillRect/>
+              </a:stretch>
+            </p:blipFill>
+            <p:spPr>
+              <a:xfrm>
+                <a:off x="3608767" y="2973306"/>
+                <a:ext cx="502327" cy="574088"/>
+              </a:xfrm>
+              <a:prstGeom prst="rect">
+                <a:avLst/>
+              </a:prstGeom>
+            </p:spPr>
+          </p:pic>
+          <p:pic>
+            <p:nvPicPr>
+              <p:cNvPr id="22" name="Graphic 21">
+                <a:extLst>
+                  <a:ext uri="{FF2B5EF4-FFF2-40B4-BE49-F238E27FC236}">
+                    <a16:creationId xmlns:a16="http://schemas.microsoft.com/office/drawing/2014/main" id="{9DAF612D-C102-EFA5-2D11-BED6325224EA}"/>
+                  </a:ext>
+                </a:extLst>
+              </p:cNvPr>
+              <p:cNvPicPr>
+                <a:picLocks noChangeAspect="1"/>
+              </p:cNvPicPr>
+              <p:nvPr/>
+            </p:nvPicPr>
+            <p:blipFill>
+              <a:blip r:embed="rId2">
+                <a:extLst>
+                  <a:ext uri="{96DAC541-7B7A-43D3-8B79-37D633B846F1}">
+                    <asvg:svgBlip xmlns:asvg="http://schemas.microsoft.com/office/drawing/2016/SVG/main" r:embed="rId3"/>
+                  </a:ext>
+                </a:extLst>
+              </a:blip>
+              <a:stretch>
+                <a:fillRect/>
+              </a:stretch>
+            </p:blipFill>
+            <p:spPr>
+              <a:xfrm>
+                <a:off x="3859928" y="2971061"/>
+                <a:ext cx="502327" cy="574088"/>
+              </a:xfrm>
+              <a:prstGeom prst="rect">
+                <a:avLst/>
+              </a:prstGeom>
+            </p:spPr>
+          </p:pic>
+          <p:pic>
+            <p:nvPicPr>
+              <p:cNvPr id="23" name="Graphic 22">
+                <a:extLst>
+                  <a:ext uri="{FF2B5EF4-FFF2-40B4-BE49-F238E27FC236}">
+                    <a16:creationId xmlns:a16="http://schemas.microsoft.com/office/drawing/2014/main" id="{DB994A79-4F11-20DE-307A-773DC75937B3}"/>
+                  </a:ext>
+                </a:extLst>
+              </p:cNvPr>
+              <p:cNvPicPr>
+                <a:picLocks noChangeAspect="1"/>
+              </p:cNvPicPr>
+              <p:nvPr/>
+            </p:nvPicPr>
+            <p:blipFill>
+              <a:blip r:embed="rId2">
+                <a:extLst>
+                  <a:ext uri="{96DAC541-7B7A-43D3-8B79-37D633B846F1}">
+                    <asvg:svgBlip xmlns:asvg="http://schemas.microsoft.com/office/drawing/2016/SVG/main" r:embed="rId3"/>
+                  </a:ext>
+                </a:extLst>
+              </a:blip>
+              <a:stretch>
+                <a:fillRect/>
+              </a:stretch>
+            </p:blipFill>
+            <p:spPr>
+              <a:xfrm>
+                <a:off x="4111091" y="2968816"/>
+                <a:ext cx="502327" cy="574088"/>
+              </a:xfrm>
+              <a:prstGeom prst="rect">
+                <a:avLst/>
+              </a:prstGeom>
+            </p:spPr>
+          </p:pic>
+        </p:grpSp>
+        <p:pic>
+          <p:nvPicPr>
+            <p:cNvPr id="38" name="Picture 37" descr="Shape&#10;&#10;Description automatically generated with low confidence">
+              <a:extLst>
+                <a:ext uri="{FF2B5EF4-FFF2-40B4-BE49-F238E27FC236}">
+                  <a16:creationId xmlns:a16="http://schemas.microsoft.com/office/drawing/2014/main" id="{AA0DF481-26EC-F10E-52A2-01FC5DF0AD75}"/>
+                </a:ext>
+              </a:extLst>
+            </p:cNvPr>
+            <p:cNvPicPr>
+              <a:picLocks noChangeAspect="1"/>
+            </p:cNvPicPr>
+            <p:nvPr/>
+          </p:nvPicPr>
+          <p:blipFill>
+            <a:blip r:embed="rId4"/>
+            <a:stretch>
+              <a:fillRect/>
+            </a:stretch>
+          </p:blipFill>
+          <p:spPr>
+            <a:xfrm>
+              <a:off x="2178203" y="2544159"/>
+              <a:ext cx="545431" cy="545431"/>
+            </a:xfrm>
+            <a:prstGeom prst="rect">
+              <a:avLst/>
+            </a:prstGeom>
+          </p:spPr>
+        </p:pic>
+        <p:pic>
+          <p:nvPicPr>
+            <p:cNvPr id="40" name="Graphic 39">
+              <a:extLst>
+                <a:ext uri="{FF2B5EF4-FFF2-40B4-BE49-F238E27FC236}">
+                  <a16:creationId xmlns:a16="http://schemas.microsoft.com/office/drawing/2014/main" id="{F844D0AA-87AA-CCA0-BC04-2130EF6E4BE3}"/>
+                </a:ext>
+              </a:extLst>
+            </p:cNvPr>
+            <p:cNvPicPr>
+              <a:picLocks noChangeAspect="1"/>
+            </p:cNvPicPr>
+            <p:nvPr/>
+          </p:nvPicPr>
+          <p:blipFill>
+            <a:blip r:embed="rId5">
+              <a:extLst>
+                <a:ext uri="{96DAC541-7B7A-43D3-8B79-37D633B846F1}">
+                  <asvg:svgBlip xmlns:asvg="http://schemas.microsoft.com/office/drawing/2016/SVG/main" r:embed="rId6"/>
+                </a:ext>
+              </a:extLst>
+            </a:blip>
+            <a:stretch>
+              <a:fillRect/>
+            </a:stretch>
+          </p:blipFill>
+          <p:spPr>
+            <a:xfrm>
+              <a:off x="2178202" y="1054772"/>
+              <a:ext cx="545431" cy="623350"/>
+            </a:xfrm>
+            <a:prstGeom prst="rect">
+              <a:avLst/>
+            </a:prstGeom>
+          </p:spPr>
+        </p:pic>
+        <p:cxnSp>
+          <p:nvCxnSpPr>
+            <p:cNvPr id="44" name="Elbow Connector 43">
+              <a:extLst>
+                <a:ext uri="{FF2B5EF4-FFF2-40B4-BE49-F238E27FC236}">
+                  <a16:creationId xmlns:a16="http://schemas.microsoft.com/office/drawing/2014/main" id="{2F2836D5-CC77-EEE9-7614-3F07F0ED5D67}"/>
+                </a:ext>
+              </a:extLst>
+            </p:cNvPr>
+            <p:cNvCxnSpPr>
+              <a:stCxn id="40" idx="3"/>
+              <a:endCxn id="5" idx="1"/>
+            </p:cNvCxnSpPr>
+            <p:nvPr/>
+          </p:nvCxnSpPr>
+          <p:spPr>
+            <a:xfrm>
+              <a:off x="2723633" y="1366447"/>
+              <a:ext cx="1666528" cy="725214"/>
+            </a:xfrm>
+            <a:prstGeom prst="bentConnector3">
+              <a:avLst/>
+            </a:prstGeom>
+            <a:ln w="38100">
+              <a:solidFill>
+                <a:schemeClr val="tx1"/>
+              </a:solidFill>
+              <a:tailEnd type="triangle"/>
+            </a:ln>
+          </p:spPr>
+          <p:style>
+            <a:lnRef idx="1">
+              <a:schemeClr val="accent1"/>
+            </a:lnRef>
+            <a:fillRef idx="0">
+              <a:schemeClr val="accent1"/>
+            </a:fillRef>
+            <a:effectRef idx="0">
+              <a:schemeClr val="accent1"/>
+            </a:effectRef>
+            <a:fontRef idx="minor">
+              <a:schemeClr val="tx1"/>
+            </a:fontRef>
+          </p:style>
+        </p:cxnSp>
+        <p:cxnSp>
+          <p:nvCxnSpPr>
+            <p:cNvPr id="46" name="Elbow Connector 45">
+              <a:extLst>
+                <a:ext uri="{FF2B5EF4-FFF2-40B4-BE49-F238E27FC236}">
+                  <a16:creationId xmlns:a16="http://schemas.microsoft.com/office/drawing/2014/main" id="{F4ED633F-3488-0BBF-4EA7-1E1AFC8DE90F}"/>
+                </a:ext>
+              </a:extLst>
+            </p:cNvPr>
+            <p:cNvCxnSpPr>
+              <a:stCxn id="38" idx="3"/>
+              <a:endCxn id="5" idx="1"/>
+            </p:cNvCxnSpPr>
+            <p:nvPr/>
+          </p:nvCxnSpPr>
+          <p:spPr>
+            <a:xfrm flipV="1">
+              <a:off x="2723634" y="2091661"/>
+              <a:ext cx="1666527" cy="725214"/>
+            </a:xfrm>
+            <a:prstGeom prst="bentConnector3">
+              <a:avLst/>
+            </a:prstGeom>
+            <a:ln w="38100">
+              <a:solidFill>
+                <a:schemeClr val="tx1"/>
+              </a:solidFill>
+              <a:tailEnd type="triangle"/>
+            </a:ln>
+          </p:spPr>
+          <p:style>
+            <a:lnRef idx="1">
+              <a:schemeClr val="accent1"/>
+            </a:lnRef>
+            <a:fillRef idx="0">
+              <a:schemeClr val="accent1"/>
+            </a:fillRef>
+            <a:effectRef idx="0">
+              <a:schemeClr val="accent1"/>
+            </a:effectRef>
+            <a:fontRef idx="minor">
+              <a:schemeClr val="tx1"/>
+            </a:fontRef>
+          </p:style>
+        </p:cxnSp>
+        <p:sp>
+          <p:nvSpPr>
+            <p:cNvPr id="47" name="TextBox 46">
+              <a:extLst>
+                <a:ext uri="{FF2B5EF4-FFF2-40B4-BE49-F238E27FC236}">
+                  <a16:creationId xmlns:a16="http://schemas.microsoft.com/office/drawing/2014/main" id="{5AB91DA7-F3FC-68E3-445D-A86B49AAA81E}"/>
+                </a:ext>
+              </a:extLst>
+            </p:cNvPr>
+            <p:cNvSpPr txBox="1"/>
+            <p:nvPr/>
+          </p:nvSpPr>
+          <p:spPr>
+            <a:xfrm>
+              <a:off x="1630820" y="702779"/>
+              <a:ext cx="1640193" cy="338554"/>
+            </a:xfrm>
+            <a:prstGeom prst="rect">
+              <a:avLst/>
+            </a:prstGeom>
+            <a:noFill/>
+          </p:spPr>
+          <p:txBody>
+            <a:bodyPr wrap="none" rtlCol="0">
+              <a:spAutoFit/>
+            </a:bodyPr>
+            <a:lstStyle/>
+            <a:p>
+              <a:r>
+                <a:rPr lang="en-GB" sz="1600" dirty="0">
+                  <a:latin typeface="American Typewriter" panose="02090604020004020304" pitchFamily="18" charset="77"/>
+                </a:rPr>
+                <a:t>Historical data</a:t>
+              </a:r>
+            </a:p>
+          </p:txBody>
+        </p:sp>
+        <p:sp>
+          <p:nvSpPr>
+            <p:cNvPr id="48" name="TextBox 47">
+              <a:extLst>
+                <a:ext uri="{FF2B5EF4-FFF2-40B4-BE49-F238E27FC236}">
+                  <a16:creationId xmlns:a16="http://schemas.microsoft.com/office/drawing/2014/main" id="{1A44F2BA-1615-2372-9C0D-8115EE550D77}"/>
+                </a:ext>
+              </a:extLst>
+            </p:cNvPr>
+            <p:cNvSpPr txBox="1"/>
+            <p:nvPr/>
+          </p:nvSpPr>
+          <p:spPr>
+            <a:xfrm>
+              <a:off x="1606454" y="3171055"/>
+              <a:ext cx="1688924" cy="338554"/>
+            </a:xfrm>
+            <a:prstGeom prst="rect">
+              <a:avLst/>
+            </a:prstGeom>
+            <a:noFill/>
+          </p:spPr>
+          <p:txBody>
+            <a:bodyPr wrap="none" rtlCol="0">
+              <a:spAutoFit/>
+            </a:bodyPr>
+            <a:lstStyle/>
+            <a:p>
+              <a:r>
+                <a:rPr lang="en-GB" sz="1600" dirty="0">
+                  <a:latin typeface="American Typewriter" panose="02090604020004020304" pitchFamily="18" charset="77"/>
+                </a:rPr>
+                <a:t>Wristband data</a:t>
+              </a:r>
+            </a:p>
+          </p:txBody>
+        </p:sp>
+        <p:cxnSp>
+          <p:nvCxnSpPr>
+            <p:cNvPr id="50" name="Straight Arrow Connector 49">
+              <a:extLst>
+                <a:ext uri="{FF2B5EF4-FFF2-40B4-BE49-F238E27FC236}">
+                  <a16:creationId xmlns:a16="http://schemas.microsoft.com/office/drawing/2014/main" id="{EE99DD81-93E5-2D59-43F6-96EC9D9C0DBF}"/>
+                </a:ext>
+              </a:extLst>
+            </p:cNvPr>
+            <p:cNvCxnSpPr>
+              <a:stCxn id="5" idx="3"/>
+            </p:cNvCxnSpPr>
+            <p:nvPr/>
+          </p:nvCxnSpPr>
+          <p:spPr>
+            <a:xfrm>
+              <a:off x="7269996" y="2091661"/>
+              <a:ext cx="915537" cy="0"/>
+            </a:xfrm>
+            <a:prstGeom prst="straightConnector1">
+              <a:avLst/>
+            </a:prstGeom>
+            <a:ln w="38100">
+              <a:solidFill>
+                <a:schemeClr val="tx1"/>
+              </a:solidFill>
+              <a:tailEnd type="triangle"/>
+            </a:ln>
+          </p:spPr>
+          <p:style>
+            <a:lnRef idx="1">
+              <a:schemeClr val="accent1"/>
+            </a:lnRef>
+            <a:fillRef idx="0">
+              <a:schemeClr val="accent1"/>
+            </a:fillRef>
+            <a:effectRef idx="0">
+              <a:schemeClr val="accent1"/>
+            </a:effectRef>
+            <a:fontRef idx="minor">
+              <a:schemeClr val="tx1"/>
+            </a:fontRef>
+          </p:style>
+        </p:cxnSp>
+        <p:sp>
+          <p:nvSpPr>
+            <p:cNvPr id="51" name="TextBox 50">
+              <a:extLst>
+                <a:ext uri="{FF2B5EF4-FFF2-40B4-BE49-F238E27FC236}">
+                  <a16:creationId xmlns:a16="http://schemas.microsoft.com/office/drawing/2014/main" id="{AB35ED2B-9C36-E376-20A6-7D53A77A9947}"/>
+                </a:ext>
+              </a:extLst>
+            </p:cNvPr>
+            <p:cNvSpPr txBox="1"/>
+            <p:nvPr/>
+          </p:nvSpPr>
+          <p:spPr>
+            <a:xfrm>
+              <a:off x="4657609" y="1007163"/>
+              <a:ext cx="2344937" cy="338554"/>
+            </a:xfrm>
+            <a:prstGeom prst="rect">
+              <a:avLst/>
+            </a:prstGeom>
+            <a:noFill/>
+          </p:spPr>
+          <p:txBody>
+            <a:bodyPr wrap="none" rtlCol="0">
+              <a:spAutoFit/>
+            </a:bodyPr>
+            <a:lstStyle/>
+            <a:p>
+              <a:r>
+                <a:rPr lang="en-GB" sz="1600" dirty="0">
+                  <a:latin typeface="American Typewriter" panose="02090604020004020304" pitchFamily="18" charset="77"/>
+                </a:rPr>
+                <a:t>Random Forest Model</a:t>
+              </a:r>
+            </a:p>
+          </p:txBody>
+        </p:sp>
+        <p:sp>
+          <p:nvSpPr>
+            <p:cNvPr id="52" name="TextBox 51">
+              <a:extLst>
+                <a:ext uri="{FF2B5EF4-FFF2-40B4-BE49-F238E27FC236}">
+                  <a16:creationId xmlns:a16="http://schemas.microsoft.com/office/drawing/2014/main" id="{6718A0F8-56BF-BDC6-C877-CC2567170C31}"/>
+                </a:ext>
+              </a:extLst>
+            </p:cNvPr>
+            <p:cNvSpPr txBox="1"/>
+            <p:nvPr/>
+          </p:nvSpPr>
+          <p:spPr>
+            <a:xfrm>
+              <a:off x="8185533" y="1806207"/>
+              <a:ext cx="1014508" cy="584775"/>
+            </a:xfrm>
+            <a:prstGeom prst="rect">
+              <a:avLst/>
+            </a:prstGeom>
+            <a:noFill/>
+          </p:spPr>
+          <p:txBody>
+            <a:bodyPr wrap="none" rtlCol="0">
+              <a:spAutoFit/>
+            </a:bodyPr>
+            <a:lstStyle/>
+            <a:p>
+              <a:pPr algn="ctr"/>
+              <a:r>
+                <a:rPr lang="en-GB" sz="1600" dirty="0">
+                  <a:latin typeface="American Typewriter" panose="02090604020004020304" pitchFamily="18" charset="77"/>
+                </a:rPr>
+                <a:t>Trained </a:t>
+              </a:r>
+            </a:p>
+            <a:p>
+              <a:pPr algn="ctr"/>
+              <a:r>
+                <a:rPr lang="en-GB" sz="1600" dirty="0">
+                  <a:latin typeface="American Typewriter" panose="02090604020004020304" pitchFamily="18" charset="77"/>
+                </a:rPr>
+                <a:t>Model</a:t>
+              </a:r>
+            </a:p>
+          </p:txBody>
+        </p:sp>
+      </p:grpSp>
+      <p:sp>
+        <p:nvSpPr>
+          <p:cNvPr id="53" name="Rounded Rectangle 52">
+            <a:extLst>
+              <a:ext uri="{FF2B5EF4-FFF2-40B4-BE49-F238E27FC236}">
+                <a16:creationId xmlns:a16="http://schemas.microsoft.com/office/drawing/2014/main" id="{B6FD2EA5-065A-5FC8-68D7-0AA5E5DFCED5}"/>
+              </a:ext>
+            </a:extLst>
+          </p:cNvPr>
+          <p:cNvSpPr/>
+          <p:nvPr/>
+        </p:nvSpPr>
+        <p:spPr>
+          <a:xfrm>
+            <a:off x="4412341" y="4467019"/>
+            <a:ext cx="2879835" cy="1450428"/>
+          </a:xfrm>
+          <a:prstGeom prst="roundRect">
+            <a:avLst/>
+          </a:prstGeom>
+          <a:noFill/>
+          <a:ln w="38100">
+            <a:solidFill>
+              <a:schemeClr val="tx1"/>
+            </a:solidFill>
+          </a:ln>
+        </p:spPr>
+        <p:style>
+          <a:lnRef idx="2">
+            <a:schemeClr val="accent1">
+              <a:shade val="50000"/>
+            </a:schemeClr>
+          </a:lnRef>
+          <a:fillRef idx="1">
+            <a:schemeClr val="accent1"/>
+          </a:fillRef>
+          <a:effectRef idx="0">
+            <a:schemeClr val="accent1"/>
+          </a:effectRef>
+          <a:fontRef idx="minor">
+            <a:schemeClr val="lt1"/>
+          </a:fontRef>
+        </p:style>
+        <p:txBody>
+          <a:bodyPr rtlCol="0" anchor="ctr"/>
+          <a:lstStyle/>
+          <a:p>
+            <a:pPr algn="ctr"/>
+            <a:endParaRPr lang="en-GB"/>
+          </a:p>
+        </p:txBody>
+      </p:sp>
+      <p:pic>
+        <p:nvPicPr>
+          <p:cNvPr id="63" name="Graphic 62">
+            <a:extLst>
+              <a:ext uri="{FF2B5EF4-FFF2-40B4-BE49-F238E27FC236}">
+                <a16:creationId xmlns:a16="http://schemas.microsoft.com/office/drawing/2014/main" id="{1F1FCEA1-0BEB-E1AF-4E96-3EC7AEA833F7}"/>
+              </a:ext>
+            </a:extLst>
+          </p:cNvPr>
+          <p:cNvPicPr>
+            <a:picLocks noChangeAspect="1"/>
+          </p:cNvPicPr>
+          <p:nvPr/>
+        </p:nvPicPr>
+        <p:blipFill>
+          <a:blip r:embed="rId5">
+            <a:extLst>
+              <a:ext uri="{96DAC541-7B7A-43D3-8B79-37D633B846F1}">
+                <asvg:svgBlip xmlns:asvg="http://schemas.microsoft.com/office/drawing/2016/SVG/main" r:embed="rId6"/>
+              </a:ext>
+            </a:extLst>
+          </a:blip>
+          <a:stretch>
+            <a:fillRect/>
+          </a:stretch>
+        </p:blipFill>
+        <p:spPr>
+          <a:xfrm>
+            <a:off x="2788821" y="4883925"/>
+            <a:ext cx="545431" cy="623350"/>
+          </a:xfrm>
+          <a:prstGeom prst="rect">
+            <a:avLst/>
+          </a:prstGeom>
+        </p:spPr>
+      </p:pic>
+      <p:sp>
+        <p:nvSpPr>
+          <p:cNvPr id="66" name="TextBox 65">
+            <a:extLst>
+              <a:ext uri="{FF2B5EF4-FFF2-40B4-BE49-F238E27FC236}">
+                <a16:creationId xmlns:a16="http://schemas.microsoft.com/office/drawing/2014/main" id="{3644711F-FB5B-6A42-9830-287076087EE7}"/>
+              </a:ext>
+            </a:extLst>
+          </p:cNvPr>
+          <p:cNvSpPr txBox="1"/>
+          <p:nvPr/>
+        </p:nvSpPr>
+        <p:spPr>
+          <a:xfrm>
+            <a:off x="2293899" y="4492756"/>
+            <a:ext cx="1640193" cy="338554"/>
+          </a:xfrm>
+          <a:prstGeom prst="rect">
+            <a:avLst/>
+          </a:prstGeom>
+          <a:noFill/>
+        </p:spPr>
+        <p:txBody>
+          <a:bodyPr wrap="none" rtlCol="0">
+            <a:spAutoFit/>
+          </a:bodyPr>
+          <a:lstStyle/>
+          <a:p>
+            <a:r>
+              <a:rPr lang="en-GB" sz="1600" dirty="0">
+                <a:latin typeface="American Typewriter" panose="02090604020004020304" pitchFamily="18" charset="77"/>
+              </a:rPr>
+              <a:t>Historical data</a:t>
+            </a:r>
+          </a:p>
+        </p:txBody>
+      </p:sp>
+      <p:cxnSp>
+        <p:nvCxnSpPr>
+          <p:cNvPr id="68" name="Straight Arrow Connector 67">
+            <a:extLst>
+              <a:ext uri="{FF2B5EF4-FFF2-40B4-BE49-F238E27FC236}">
+                <a16:creationId xmlns:a16="http://schemas.microsoft.com/office/drawing/2014/main" id="{5BD4FB3E-EA69-A76A-3BF4-8B4A1F0064C8}"/>
+              </a:ext>
+            </a:extLst>
+          </p:cNvPr>
+          <p:cNvCxnSpPr>
+            <a:stCxn id="53" idx="3"/>
+          </p:cNvCxnSpPr>
+          <p:nvPr/>
+        </p:nvCxnSpPr>
+        <p:spPr>
+          <a:xfrm>
+            <a:off x="7292176" y="5192233"/>
+            <a:ext cx="915537" cy="0"/>
+          </a:xfrm>
+          <a:prstGeom prst="straightConnector1">
+            <a:avLst/>
+          </a:prstGeom>
+          <a:ln w="38100">
+            <a:solidFill>
+              <a:schemeClr val="tx1"/>
+            </a:solidFill>
+            <a:tailEnd type="triangle"/>
+          </a:ln>
+        </p:spPr>
+        <p:style>
+          <a:lnRef idx="1">
+            <a:schemeClr val="accent1"/>
+          </a:lnRef>
+          <a:fillRef idx="0">
+            <a:schemeClr val="accent1"/>
+          </a:fillRef>
+          <a:effectRef idx="0">
+            <a:schemeClr val="accent1"/>
+          </a:effectRef>
+          <a:fontRef idx="minor">
+            <a:schemeClr val="tx1"/>
+          </a:fontRef>
+        </p:style>
+      </p:cxnSp>
+      <p:sp>
+        <p:nvSpPr>
+          <p:cNvPr id="69" name="TextBox 68">
+            <a:extLst>
+              <a:ext uri="{FF2B5EF4-FFF2-40B4-BE49-F238E27FC236}">
+                <a16:creationId xmlns:a16="http://schemas.microsoft.com/office/drawing/2014/main" id="{4A2718F3-D6D4-903B-8D94-EE0BFBFED3B9}"/>
+              </a:ext>
+            </a:extLst>
+          </p:cNvPr>
+          <p:cNvSpPr txBox="1"/>
+          <p:nvPr/>
+        </p:nvSpPr>
+        <p:spPr>
+          <a:xfrm>
+            <a:off x="4761253" y="3875508"/>
+            <a:ext cx="2182008" cy="584775"/>
+          </a:xfrm>
+          <a:prstGeom prst="rect">
+            <a:avLst/>
+          </a:prstGeom>
+          <a:noFill/>
+        </p:spPr>
+        <p:txBody>
+          <a:bodyPr wrap="none" rtlCol="0">
+            <a:spAutoFit/>
+          </a:bodyPr>
+          <a:lstStyle/>
+          <a:p>
+            <a:pPr algn="ctr"/>
+            <a:r>
+              <a:rPr lang="en-GB" sz="1600" dirty="0">
+                <a:latin typeface="American Typewriter" panose="02090604020004020304" pitchFamily="18" charset="77"/>
+              </a:rPr>
+              <a:t>K-means Clustering </a:t>
+            </a:r>
+          </a:p>
+          <a:p>
+            <a:pPr algn="ctr"/>
+            <a:r>
+              <a:rPr lang="en-GB" sz="1600" dirty="0">
+                <a:latin typeface="American Typewriter" panose="02090604020004020304" pitchFamily="18" charset="77"/>
+              </a:rPr>
+              <a:t>Model</a:t>
+            </a:r>
+          </a:p>
+        </p:txBody>
+      </p:sp>
+      <p:sp>
+        <p:nvSpPr>
+          <p:cNvPr id="70" name="TextBox 69">
+            <a:extLst>
+              <a:ext uri="{FF2B5EF4-FFF2-40B4-BE49-F238E27FC236}">
+                <a16:creationId xmlns:a16="http://schemas.microsoft.com/office/drawing/2014/main" id="{ED74A3B1-F2D8-7F8A-1DDD-F10D75CFCC47}"/>
+              </a:ext>
+            </a:extLst>
+          </p:cNvPr>
+          <p:cNvSpPr txBox="1"/>
+          <p:nvPr/>
+        </p:nvSpPr>
+        <p:spPr>
+          <a:xfrm>
+            <a:off x="8207713" y="4878958"/>
+            <a:ext cx="1014508" cy="584775"/>
+          </a:xfrm>
+          <a:prstGeom prst="rect">
+            <a:avLst/>
+          </a:prstGeom>
+          <a:noFill/>
+        </p:spPr>
+        <p:txBody>
+          <a:bodyPr wrap="none" rtlCol="0">
+            <a:spAutoFit/>
+          </a:bodyPr>
+          <a:lstStyle/>
+          <a:p>
+            <a:pPr algn="ctr"/>
+            <a:r>
+              <a:rPr lang="en-GB" sz="1600" dirty="0">
+                <a:latin typeface="American Typewriter" panose="02090604020004020304" pitchFamily="18" charset="77"/>
+              </a:rPr>
+              <a:t>Trained </a:t>
+            </a:r>
+          </a:p>
+          <a:p>
+            <a:pPr algn="ctr"/>
+            <a:r>
+              <a:rPr lang="en-GB" sz="1600" dirty="0">
+                <a:latin typeface="American Typewriter" panose="02090604020004020304" pitchFamily="18" charset="77"/>
+              </a:rPr>
+              <a:t>Model</a:t>
+            </a:r>
+          </a:p>
+        </p:txBody>
+      </p:sp>
+      <p:cxnSp>
+        <p:nvCxnSpPr>
+          <p:cNvPr id="75" name="Straight Arrow Connector 74">
+            <a:extLst>
+              <a:ext uri="{FF2B5EF4-FFF2-40B4-BE49-F238E27FC236}">
+                <a16:creationId xmlns:a16="http://schemas.microsoft.com/office/drawing/2014/main" id="{544E41FF-7606-6253-15DC-14F1B5F6B68B}"/>
+              </a:ext>
+            </a:extLst>
+          </p:cNvPr>
+          <p:cNvCxnSpPr/>
+          <p:nvPr/>
+        </p:nvCxnSpPr>
+        <p:spPr>
+          <a:xfrm>
+            <a:off x="3496804" y="5195600"/>
+            <a:ext cx="915537" cy="0"/>
+          </a:xfrm>
+          <a:prstGeom prst="straightConnector1">
+            <a:avLst/>
+          </a:prstGeom>
+          <a:ln w="38100">
+            <a:solidFill>
+              <a:schemeClr val="tx1"/>
+            </a:solidFill>
+            <a:tailEnd type="triangle"/>
+          </a:ln>
+        </p:spPr>
+        <p:style>
+          <a:lnRef idx="1">
+            <a:schemeClr val="accent1"/>
+          </a:lnRef>
+          <a:fillRef idx="0">
+            <a:schemeClr val="accent1"/>
+          </a:fillRef>
+          <a:effectRef idx="0">
+            <a:schemeClr val="accent1"/>
+          </a:effectRef>
+          <a:fontRef idx="minor">
+            <a:schemeClr val="tx1"/>
+          </a:fontRef>
+        </p:style>
+      </p:cxnSp>
+      <p:sp>
+        <p:nvSpPr>
+          <p:cNvPr id="77" name="Oval 76">
+            <a:extLst>
+              <a:ext uri="{FF2B5EF4-FFF2-40B4-BE49-F238E27FC236}">
+                <a16:creationId xmlns:a16="http://schemas.microsoft.com/office/drawing/2014/main" id="{2F459082-41C1-C237-7C06-2BDB89E32EE9}"/>
+              </a:ext>
+            </a:extLst>
+          </p:cNvPr>
+          <p:cNvSpPr/>
+          <p:nvPr/>
+        </p:nvSpPr>
+        <p:spPr>
+          <a:xfrm>
+            <a:off x="4954772" y="5628167"/>
+            <a:ext cx="63795" cy="56707"/>
+          </a:xfrm>
+          <a:prstGeom prst="ellipse">
+            <a:avLst/>
+          </a:prstGeom>
+          <a:solidFill>
+            <a:srgbClr val="FF0000"/>
+          </a:solidFill>
+          <a:ln>
+            <a:solidFill>
+              <a:srgbClr val="FF0000"/>
+            </a:solidFill>
+          </a:ln>
+        </p:spPr>
+        <p:style>
+          <a:lnRef idx="2">
+            <a:schemeClr val="accent1">
+              <a:shade val="50000"/>
+            </a:schemeClr>
+          </a:lnRef>
+          <a:fillRef idx="1">
+            <a:schemeClr val="accent1"/>
+          </a:fillRef>
+          <a:effectRef idx="0">
+            <a:schemeClr val="accent1"/>
+          </a:effectRef>
+          <a:fontRef idx="minor">
+            <a:schemeClr val="lt1"/>
+          </a:fontRef>
+        </p:style>
+        <p:txBody>
+          <a:bodyPr rtlCol="0" anchor="ctr"/>
+          <a:lstStyle/>
+          <a:p>
+            <a:pPr algn="ctr"/>
+            <a:endParaRPr lang="en-GB"/>
+          </a:p>
+        </p:txBody>
+      </p:sp>
+      <p:sp>
+        <p:nvSpPr>
+          <p:cNvPr id="78" name="Oval 77">
+            <a:extLst>
+              <a:ext uri="{FF2B5EF4-FFF2-40B4-BE49-F238E27FC236}">
+                <a16:creationId xmlns:a16="http://schemas.microsoft.com/office/drawing/2014/main" id="{DD997F86-F245-8D72-B867-A6F0D2DD3747}"/>
+              </a:ext>
+            </a:extLst>
+          </p:cNvPr>
+          <p:cNvSpPr/>
+          <p:nvPr/>
+        </p:nvSpPr>
+        <p:spPr>
+          <a:xfrm>
+            <a:off x="5112946" y="5638799"/>
+            <a:ext cx="63795" cy="56707"/>
+          </a:xfrm>
+          <a:prstGeom prst="ellipse">
+            <a:avLst/>
+          </a:prstGeom>
+          <a:solidFill>
+            <a:srgbClr val="FF0000"/>
+          </a:solidFill>
+          <a:ln>
+            <a:solidFill>
+              <a:srgbClr val="FF0000"/>
+            </a:solidFill>
+          </a:ln>
+        </p:spPr>
+        <p:style>
+          <a:lnRef idx="2">
+            <a:schemeClr val="accent1">
+              <a:shade val="50000"/>
+            </a:schemeClr>
+          </a:lnRef>
+          <a:fillRef idx="1">
+            <a:schemeClr val="accent1"/>
+          </a:fillRef>
+          <a:effectRef idx="0">
+            <a:schemeClr val="accent1"/>
+          </a:effectRef>
+          <a:fontRef idx="minor">
+            <a:schemeClr val="lt1"/>
+          </a:fontRef>
+        </p:style>
+        <p:txBody>
+          <a:bodyPr rtlCol="0" anchor="ctr"/>
+          <a:lstStyle/>
+          <a:p>
+            <a:pPr algn="ctr"/>
+            <a:endParaRPr lang="en-GB"/>
+          </a:p>
+        </p:txBody>
+      </p:sp>
+      <p:sp>
+        <p:nvSpPr>
+          <p:cNvPr id="79" name="Oval 78">
+            <a:extLst>
+              <a:ext uri="{FF2B5EF4-FFF2-40B4-BE49-F238E27FC236}">
+                <a16:creationId xmlns:a16="http://schemas.microsoft.com/office/drawing/2014/main" id="{86567FD0-7480-D622-12F9-2465A1D7F85E}"/>
+              </a:ext>
+            </a:extLst>
+          </p:cNvPr>
+          <p:cNvSpPr/>
+          <p:nvPr/>
+        </p:nvSpPr>
+        <p:spPr>
+          <a:xfrm>
+            <a:off x="4847607" y="5403540"/>
+            <a:ext cx="63795" cy="56707"/>
+          </a:xfrm>
+          <a:prstGeom prst="ellipse">
+            <a:avLst/>
+          </a:prstGeom>
+          <a:solidFill>
+            <a:srgbClr val="FF0000"/>
+          </a:solidFill>
+          <a:ln>
+            <a:solidFill>
+              <a:srgbClr val="FF0000"/>
+            </a:solidFill>
+          </a:ln>
+        </p:spPr>
+        <p:style>
+          <a:lnRef idx="2">
+            <a:schemeClr val="accent1">
+              <a:shade val="50000"/>
+            </a:schemeClr>
+          </a:lnRef>
+          <a:fillRef idx="1">
+            <a:schemeClr val="accent1"/>
+          </a:fillRef>
+          <a:effectRef idx="0">
+            <a:schemeClr val="accent1"/>
+          </a:effectRef>
+          <a:fontRef idx="minor">
+            <a:schemeClr val="lt1"/>
+          </a:fontRef>
+        </p:style>
+        <p:txBody>
+          <a:bodyPr rtlCol="0" anchor="ctr"/>
+          <a:lstStyle/>
+          <a:p>
+            <a:pPr algn="ctr"/>
+            <a:endParaRPr lang="en-GB"/>
+          </a:p>
+        </p:txBody>
+      </p:sp>
+      <p:sp>
+        <p:nvSpPr>
+          <p:cNvPr id="80" name="Oval 79">
+            <a:extLst>
+              <a:ext uri="{FF2B5EF4-FFF2-40B4-BE49-F238E27FC236}">
+                <a16:creationId xmlns:a16="http://schemas.microsoft.com/office/drawing/2014/main" id="{3E3E8CAD-8F66-CBE8-4E6D-151C7534F4B1}"/>
+              </a:ext>
+            </a:extLst>
+          </p:cNvPr>
+          <p:cNvSpPr/>
+          <p:nvPr/>
+        </p:nvSpPr>
+        <p:spPr>
+          <a:xfrm>
+            <a:off x="5120034" y="5386816"/>
+            <a:ext cx="63795" cy="56707"/>
+          </a:xfrm>
+          <a:prstGeom prst="ellipse">
+            <a:avLst/>
+          </a:prstGeom>
+          <a:solidFill>
+            <a:srgbClr val="FF0000"/>
+          </a:solidFill>
+          <a:ln>
+            <a:solidFill>
+              <a:srgbClr val="FF0000"/>
+            </a:solidFill>
+          </a:ln>
+        </p:spPr>
+        <p:style>
+          <a:lnRef idx="2">
+            <a:schemeClr val="accent1">
+              <a:shade val="50000"/>
+            </a:schemeClr>
+          </a:lnRef>
+          <a:fillRef idx="1">
+            <a:schemeClr val="accent1"/>
+          </a:fillRef>
+          <a:effectRef idx="0">
+            <a:schemeClr val="accent1"/>
+          </a:effectRef>
+          <a:fontRef idx="minor">
+            <a:schemeClr val="lt1"/>
+          </a:fontRef>
+        </p:style>
+        <p:txBody>
+          <a:bodyPr rtlCol="0" anchor="ctr"/>
+          <a:lstStyle/>
+          <a:p>
+            <a:pPr algn="ctr"/>
+            <a:endParaRPr lang="en-GB"/>
+          </a:p>
+        </p:txBody>
+      </p:sp>
+      <p:sp>
+        <p:nvSpPr>
+          <p:cNvPr id="81" name="Oval 80">
+            <a:extLst>
+              <a:ext uri="{FF2B5EF4-FFF2-40B4-BE49-F238E27FC236}">
+                <a16:creationId xmlns:a16="http://schemas.microsoft.com/office/drawing/2014/main" id="{4BE1F301-087A-E72D-FF36-07A89877C6EB}"/>
+              </a:ext>
+            </a:extLst>
+          </p:cNvPr>
+          <p:cNvSpPr/>
+          <p:nvPr/>
+        </p:nvSpPr>
+        <p:spPr>
+          <a:xfrm>
+            <a:off x="5339300" y="5571460"/>
+            <a:ext cx="63795" cy="56707"/>
+          </a:xfrm>
+          <a:prstGeom prst="ellipse">
+            <a:avLst/>
+          </a:prstGeom>
+          <a:solidFill>
+            <a:srgbClr val="FF0000"/>
+          </a:solidFill>
+          <a:ln>
+            <a:solidFill>
+              <a:srgbClr val="FF0000"/>
+            </a:solidFill>
+          </a:ln>
+        </p:spPr>
+        <p:style>
+          <a:lnRef idx="2">
+            <a:schemeClr val="accent1">
+              <a:shade val="50000"/>
+            </a:schemeClr>
+          </a:lnRef>
+          <a:fillRef idx="1">
+            <a:schemeClr val="accent1"/>
+          </a:fillRef>
+          <a:effectRef idx="0">
+            <a:schemeClr val="accent1"/>
+          </a:effectRef>
+          <a:fontRef idx="minor">
+            <a:schemeClr val="lt1"/>
+          </a:fontRef>
+        </p:style>
+        <p:txBody>
+          <a:bodyPr rtlCol="0" anchor="ctr"/>
+          <a:lstStyle/>
+          <a:p>
+            <a:pPr algn="ctr"/>
+            <a:endParaRPr lang="en-GB"/>
+          </a:p>
+        </p:txBody>
+      </p:sp>
+      <p:sp>
+        <p:nvSpPr>
+          <p:cNvPr id="82" name="Oval 81">
+            <a:extLst>
+              <a:ext uri="{FF2B5EF4-FFF2-40B4-BE49-F238E27FC236}">
+                <a16:creationId xmlns:a16="http://schemas.microsoft.com/office/drawing/2014/main" id="{8AD39402-BE6B-B2AD-092A-EE38204B4645}"/>
+              </a:ext>
+            </a:extLst>
+          </p:cNvPr>
+          <p:cNvSpPr/>
+          <p:nvPr/>
+        </p:nvSpPr>
+        <p:spPr>
+          <a:xfrm>
+            <a:off x="5685789" y="4841595"/>
+            <a:ext cx="63795" cy="56707"/>
+          </a:xfrm>
+          <a:prstGeom prst="ellipse">
+            <a:avLst/>
+          </a:prstGeom>
+          <a:solidFill>
+            <a:srgbClr val="00B050"/>
+          </a:solidFill>
+          <a:ln>
+            <a:solidFill>
+              <a:srgbClr val="00B050"/>
+            </a:solidFill>
+          </a:ln>
+        </p:spPr>
+        <p:style>
+          <a:lnRef idx="2">
+            <a:schemeClr val="accent1">
+              <a:shade val="50000"/>
+            </a:schemeClr>
+          </a:lnRef>
+          <a:fillRef idx="1">
+            <a:schemeClr val="accent1"/>
+          </a:fillRef>
+          <a:effectRef idx="0">
+            <a:schemeClr val="accent1"/>
+          </a:effectRef>
+          <a:fontRef idx="minor">
+            <a:schemeClr val="lt1"/>
+          </a:fontRef>
+        </p:style>
+        <p:txBody>
+          <a:bodyPr rtlCol="0" anchor="ctr"/>
+          <a:lstStyle/>
+          <a:p>
+            <a:pPr algn="ctr"/>
+            <a:endParaRPr lang="en-GB"/>
+          </a:p>
+        </p:txBody>
+      </p:sp>
+      <p:sp>
+        <p:nvSpPr>
+          <p:cNvPr id="84" name="Oval 83">
+            <a:extLst>
+              <a:ext uri="{FF2B5EF4-FFF2-40B4-BE49-F238E27FC236}">
+                <a16:creationId xmlns:a16="http://schemas.microsoft.com/office/drawing/2014/main" id="{DEF837C3-9C5C-F5B3-1455-C98C9D32F11D}"/>
+              </a:ext>
+            </a:extLst>
+          </p:cNvPr>
+          <p:cNvSpPr/>
+          <p:nvPr/>
+        </p:nvSpPr>
+        <p:spPr>
+          <a:xfrm>
+            <a:off x="5800046" y="4838087"/>
+            <a:ext cx="63795" cy="56707"/>
+          </a:xfrm>
+          <a:prstGeom prst="ellipse">
+            <a:avLst/>
+          </a:prstGeom>
+          <a:solidFill>
+            <a:srgbClr val="00B050"/>
+          </a:solidFill>
+          <a:ln>
+            <a:solidFill>
+              <a:srgbClr val="00B050"/>
+            </a:solidFill>
+          </a:ln>
+        </p:spPr>
+        <p:style>
+          <a:lnRef idx="2">
+            <a:schemeClr val="accent1">
+              <a:shade val="50000"/>
+            </a:schemeClr>
+          </a:lnRef>
+          <a:fillRef idx="1">
+            <a:schemeClr val="accent1"/>
+          </a:fillRef>
+          <a:effectRef idx="0">
+            <a:schemeClr val="accent1"/>
+          </a:effectRef>
+          <a:fontRef idx="minor">
+            <a:schemeClr val="lt1"/>
+          </a:fontRef>
+        </p:style>
+        <p:txBody>
+          <a:bodyPr rtlCol="0" anchor="ctr"/>
+          <a:lstStyle/>
+          <a:p>
+            <a:pPr algn="ctr"/>
+            <a:endParaRPr lang="en-GB"/>
+          </a:p>
+        </p:txBody>
+      </p:sp>
+      <p:sp>
+        <p:nvSpPr>
+          <p:cNvPr id="85" name="Oval 84">
+            <a:extLst>
+              <a:ext uri="{FF2B5EF4-FFF2-40B4-BE49-F238E27FC236}">
+                <a16:creationId xmlns:a16="http://schemas.microsoft.com/office/drawing/2014/main" id="{9BFFCA7C-C85C-8ACD-2718-06FABE5CA461}"/>
+              </a:ext>
+            </a:extLst>
+          </p:cNvPr>
+          <p:cNvSpPr/>
+          <p:nvPr/>
+        </p:nvSpPr>
+        <p:spPr>
+          <a:xfrm>
+            <a:off x="5571061" y="4934121"/>
+            <a:ext cx="63795" cy="56707"/>
+          </a:xfrm>
+          <a:prstGeom prst="ellipse">
+            <a:avLst/>
+          </a:prstGeom>
+          <a:solidFill>
+            <a:srgbClr val="00B050"/>
+          </a:solidFill>
+          <a:ln>
+            <a:solidFill>
+              <a:srgbClr val="00B050"/>
+            </a:solidFill>
+          </a:ln>
+        </p:spPr>
+        <p:style>
+          <a:lnRef idx="2">
+            <a:schemeClr val="accent1">
+              <a:shade val="50000"/>
+            </a:schemeClr>
+          </a:lnRef>
+          <a:fillRef idx="1">
+            <a:schemeClr val="accent1"/>
+          </a:fillRef>
+          <a:effectRef idx="0">
+            <a:schemeClr val="accent1"/>
+          </a:effectRef>
+          <a:fontRef idx="minor">
+            <a:schemeClr val="lt1"/>
+          </a:fontRef>
+        </p:style>
+        <p:txBody>
+          <a:bodyPr rtlCol="0" anchor="ctr"/>
+          <a:lstStyle/>
+          <a:p>
+            <a:pPr algn="ctr"/>
+            <a:endParaRPr lang="en-GB"/>
+          </a:p>
+        </p:txBody>
+      </p:sp>
+      <p:sp>
+        <p:nvSpPr>
+          <p:cNvPr id="86" name="Oval 85">
+            <a:extLst>
+              <a:ext uri="{FF2B5EF4-FFF2-40B4-BE49-F238E27FC236}">
+                <a16:creationId xmlns:a16="http://schemas.microsoft.com/office/drawing/2014/main" id="{A0489B72-E101-E1EB-5475-7F43145EF610}"/>
+              </a:ext>
+            </a:extLst>
+          </p:cNvPr>
+          <p:cNvSpPr/>
+          <p:nvPr/>
+        </p:nvSpPr>
+        <p:spPr>
+          <a:xfrm>
+            <a:off x="5718598" y="4973398"/>
+            <a:ext cx="63795" cy="56707"/>
+          </a:xfrm>
+          <a:prstGeom prst="ellipse">
+            <a:avLst/>
+          </a:prstGeom>
+          <a:solidFill>
+            <a:srgbClr val="00B050"/>
+          </a:solidFill>
+          <a:ln>
+            <a:solidFill>
+              <a:srgbClr val="00B050"/>
+            </a:solidFill>
+          </a:ln>
+        </p:spPr>
+        <p:style>
+          <a:lnRef idx="2">
+            <a:schemeClr val="accent1">
+              <a:shade val="50000"/>
+            </a:schemeClr>
+          </a:lnRef>
+          <a:fillRef idx="1">
+            <a:schemeClr val="accent1"/>
+          </a:fillRef>
+          <a:effectRef idx="0">
+            <a:schemeClr val="accent1"/>
+          </a:effectRef>
+          <a:fontRef idx="minor">
+            <a:schemeClr val="lt1"/>
+          </a:fontRef>
+        </p:style>
+        <p:txBody>
+          <a:bodyPr rtlCol="0" anchor="ctr"/>
+          <a:lstStyle/>
+          <a:p>
+            <a:pPr algn="ctr"/>
+            <a:endParaRPr lang="en-GB"/>
+          </a:p>
+        </p:txBody>
+      </p:sp>
+      <p:sp>
+        <p:nvSpPr>
+          <p:cNvPr id="87" name="Oval 86">
+            <a:extLst>
+              <a:ext uri="{FF2B5EF4-FFF2-40B4-BE49-F238E27FC236}">
+                <a16:creationId xmlns:a16="http://schemas.microsoft.com/office/drawing/2014/main" id="{83B89F83-C144-3B05-1FB1-8D4224254B35}"/>
+              </a:ext>
+            </a:extLst>
+          </p:cNvPr>
+          <p:cNvSpPr/>
+          <p:nvPr/>
+        </p:nvSpPr>
+        <p:spPr>
+          <a:xfrm>
+            <a:off x="5838189" y="4993995"/>
+            <a:ext cx="63795" cy="56707"/>
+          </a:xfrm>
+          <a:prstGeom prst="ellipse">
+            <a:avLst/>
+          </a:prstGeom>
+          <a:solidFill>
+            <a:srgbClr val="00B050"/>
+          </a:solidFill>
+          <a:ln>
+            <a:solidFill>
+              <a:srgbClr val="00B050"/>
+            </a:solidFill>
+          </a:ln>
+        </p:spPr>
+        <p:style>
+          <a:lnRef idx="2">
+            <a:schemeClr val="accent1">
+              <a:shade val="50000"/>
+            </a:schemeClr>
+          </a:lnRef>
+          <a:fillRef idx="1">
+            <a:schemeClr val="accent1"/>
+          </a:fillRef>
+          <a:effectRef idx="0">
+            <a:schemeClr val="accent1"/>
+          </a:effectRef>
+          <a:fontRef idx="minor">
+            <a:schemeClr val="lt1"/>
+          </a:fontRef>
+        </p:style>
+        <p:txBody>
+          <a:bodyPr rtlCol="0" anchor="ctr"/>
+          <a:lstStyle/>
+          <a:p>
+            <a:pPr algn="ctr"/>
+            <a:endParaRPr lang="en-GB"/>
+          </a:p>
+        </p:txBody>
+      </p:sp>
+      <p:sp>
+        <p:nvSpPr>
+          <p:cNvPr id="88" name="Oval 87">
+            <a:extLst>
+              <a:ext uri="{FF2B5EF4-FFF2-40B4-BE49-F238E27FC236}">
+                <a16:creationId xmlns:a16="http://schemas.microsoft.com/office/drawing/2014/main" id="{D4B10F36-497E-6F70-4D9D-661B358580B9}"/>
+              </a:ext>
+            </a:extLst>
+          </p:cNvPr>
+          <p:cNvSpPr/>
+          <p:nvPr/>
+        </p:nvSpPr>
+        <p:spPr>
+          <a:xfrm>
+            <a:off x="5434151" y="4745231"/>
+            <a:ext cx="63795" cy="56707"/>
+          </a:xfrm>
+          <a:prstGeom prst="ellipse">
+            <a:avLst/>
+          </a:prstGeom>
+          <a:solidFill>
+            <a:srgbClr val="00B050"/>
+          </a:solidFill>
+          <a:ln>
+            <a:solidFill>
+              <a:srgbClr val="00B050"/>
+            </a:solidFill>
+          </a:ln>
+        </p:spPr>
+        <p:style>
+          <a:lnRef idx="2">
+            <a:schemeClr val="accent1">
+              <a:shade val="50000"/>
+            </a:schemeClr>
+          </a:lnRef>
+          <a:fillRef idx="1">
+            <a:schemeClr val="accent1"/>
+          </a:fillRef>
+          <a:effectRef idx="0">
+            <a:schemeClr val="accent1"/>
+          </a:effectRef>
+          <a:fontRef idx="minor">
+            <a:schemeClr val="lt1"/>
+          </a:fontRef>
+        </p:style>
+        <p:txBody>
+          <a:bodyPr rtlCol="0" anchor="ctr"/>
+          <a:lstStyle/>
+          <a:p>
+            <a:pPr algn="ctr"/>
+            <a:endParaRPr lang="en-GB"/>
+          </a:p>
+        </p:txBody>
+      </p:sp>
+      <p:sp>
+        <p:nvSpPr>
+          <p:cNvPr id="89" name="Oval 88">
+            <a:extLst>
+              <a:ext uri="{FF2B5EF4-FFF2-40B4-BE49-F238E27FC236}">
+                <a16:creationId xmlns:a16="http://schemas.microsoft.com/office/drawing/2014/main" id="{FD9FDF92-6193-8271-23D6-3F53CAA1AFDB}"/>
+              </a:ext>
+            </a:extLst>
+          </p:cNvPr>
+          <p:cNvSpPr/>
+          <p:nvPr/>
+        </p:nvSpPr>
+        <p:spPr>
+          <a:xfrm>
+            <a:off x="5860022" y="4682179"/>
+            <a:ext cx="63795" cy="56707"/>
+          </a:xfrm>
+          <a:prstGeom prst="ellipse">
+            <a:avLst/>
+          </a:prstGeom>
+          <a:solidFill>
+            <a:srgbClr val="00B050"/>
+          </a:solidFill>
+          <a:ln>
+            <a:solidFill>
+              <a:srgbClr val="00B050"/>
+            </a:solidFill>
+          </a:ln>
+        </p:spPr>
+        <p:style>
+          <a:lnRef idx="2">
+            <a:schemeClr val="accent1">
+              <a:shade val="50000"/>
+            </a:schemeClr>
+          </a:lnRef>
+          <a:fillRef idx="1">
+            <a:schemeClr val="accent1"/>
+          </a:fillRef>
+          <a:effectRef idx="0">
+            <a:schemeClr val="accent1"/>
+          </a:effectRef>
+          <a:fontRef idx="minor">
+            <a:schemeClr val="lt1"/>
+          </a:fontRef>
+        </p:style>
+        <p:txBody>
+          <a:bodyPr rtlCol="0" anchor="ctr"/>
+          <a:lstStyle/>
+          <a:p>
+            <a:pPr algn="ctr"/>
+            <a:endParaRPr lang="en-GB"/>
+          </a:p>
+        </p:txBody>
+      </p:sp>
+      <p:sp>
+        <p:nvSpPr>
+          <p:cNvPr id="90" name="Oval 89">
+            <a:extLst>
+              <a:ext uri="{FF2B5EF4-FFF2-40B4-BE49-F238E27FC236}">
+                <a16:creationId xmlns:a16="http://schemas.microsoft.com/office/drawing/2014/main" id="{81F396EE-868E-E63B-D461-B533E5A83F50}"/>
+              </a:ext>
+            </a:extLst>
+          </p:cNvPr>
+          <p:cNvSpPr/>
+          <p:nvPr/>
+        </p:nvSpPr>
+        <p:spPr>
+          <a:xfrm>
+            <a:off x="5983501" y="4866440"/>
+            <a:ext cx="63795" cy="56707"/>
+          </a:xfrm>
+          <a:prstGeom prst="ellipse">
+            <a:avLst/>
+          </a:prstGeom>
+          <a:solidFill>
+            <a:srgbClr val="00B050"/>
+          </a:solidFill>
+          <a:ln>
+            <a:solidFill>
+              <a:srgbClr val="00B050"/>
+            </a:solidFill>
+          </a:ln>
+        </p:spPr>
+        <p:style>
+          <a:lnRef idx="2">
+            <a:schemeClr val="accent1">
+              <a:shade val="50000"/>
+            </a:schemeClr>
+          </a:lnRef>
+          <a:fillRef idx="1">
+            <a:schemeClr val="accent1"/>
+          </a:fillRef>
+          <a:effectRef idx="0">
+            <a:schemeClr val="accent1"/>
+          </a:effectRef>
+          <a:fontRef idx="minor">
+            <a:schemeClr val="lt1"/>
+          </a:fontRef>
+        </p:style>
+        <p:txBody>
+          <a:bodyPr rtlCol="0" anchor="ctr"/>
+          <a:lstStyle/>
+          <a:p>
+            <a:pPr algn="ctr"/>
+            <a:endParaRPr lang="en-GB"/>
+          </a:p>
+        </p:txBody>
+      </p:sp>
+      <p:sp>
+        <p:nvSpPr>
+          <p:cNvPr id="91" name="Oval 90">
+            <a:extLst>
+              <a:ext uri="{FF2B5EF4-FFF2-40B4-BE49-F238E27FC236}">
+                <a16:creationId xmlns:a16="http://schemas.microsoft.com/office/drawing/2014/main" id="{45FC569E-79C9-E534-14CE-770E7E42FDC1}"/>
+              </a:ext>
+            </a:extLst>
+          </p:cNvPr>
+          <p:cNvSpPr/>
+          <p:nvPr/>
+        </p:nvSpPr>
+        <p:spPr>
+          <a:xfrm>
+            <a:off x="6703850" y="5553740"/>
+            <a:ext cx="63795" cy="56707"/>
+          </a:xfrm>
+          <a:prstGeom prst="ellipse">
+            <a:avLst/>
+          </a:prstGeom>
+        </p:spPr>
+        <p:style>
+          <a:lnRef idx="2">
+            <a:schemeClr val="accent1">
+              <a:shade val="50000"/>
+            </a:schemeClr>
+          </a:lnRef>
+          <a:fillRef idx="1">
+            <a:schemeClr val="accent1"/>
+          </a:fillRef>
+          <a:effectRef idx="0">
+            <a:schemeClr val="accent1"/>
+          </a:effectRef>
+          <a:fontRef idx="minor">
+            <a:schemeClr val="lt1"/>
+          </a:fontRef>
+        </p:style>
+        <p:txBody>
+          <a:bodyPr rtlCol="0" anchor="ctr"/>
+          <a:lstStyle/>
+          <a:p>
+            <a:pPr algn="ctr"/>
+            <a:endParaRPr lang="en-GB"/>
+          </a:p>
+        </p:txBody>
+      </p:sp>
+      <p:sp>
+        <p:nvSpPr>
+          <p:cNvPr id="92" name="Oval 91">
+            <a:extLst>
+              <a:ext uri="{FF2B5EF4-FFF2-40B4-BE49-F238E27FC236}">
+                <a16:creationId xmlns:a16="http://schemas.microsoft.com/office/drawing/2014/main" id="{EF4BC8DD-4716-2188-CCB9-E9DDFD604480}"/>
+              </a:ext>
+            </a:extLst>
+          </p:cNvPr>
+          <p:cNvSpPr/>
+          <p:nvPr/>
+        </p:nvSpPr>
+        <p:spPr>
+          <a:xfrm>
+            <a:off x="6826306" y="5507665"/>
+            <a:ext cx="63795" cy="56707"/>
+          </a:xfrm>
+          <a:prstGeom prst="ellipse">
+            <a:avLst/>
+          </a:prstGeom>
+        </p:spPr>
+        <p:style>
+          <a:lnRef idx="2">
+            <a:schemeClr val="accent1">
+              <a:shade val="50000"/>
+            </a:schemeClr>
+          </a:lnRef>
+          <a:fillRef idx="1">
+            <a:schemeClr val="accent1"/>
+          </a:fillRef>
+          <a:effectRef idx="0">
+            <a:schemeClr val="accent1"/>
+          </a:effectRef>
+          <a:fontRef idx="minor">
+            <a:schemeClr val="lt1"/>
+          </a:fontRef>
+        </p:style>
+        <p:txBody>
+          <a:bodyPr rtlCol="0" anchor="ctr"/>
+          <a:lstStyle/>
+          <a:p>
+            <a:pPr algn="ctr"/>
+            <a:endParaRPr lang="en-GB"/>
+          </a:p>
+        </p:txBody>
+      </p:sp>
+      <p:sp>
+        <p:nvSpPr>
+          <p:cNvPr id="93" name="Oval 92">
+            <a:extLst>
+              <a:ext uri="{FF2B5EF4-FFF2-40B4-BE49-F238E27FC236}">
+                <a16:creationId xmlns:a16="http://schemas.microsoft.com/office/drawing/2014/main" id="{9A6FB63C-990C-DD67-8070-D49FFEF0EBE1}"/>
+              </a:ext>
+            </a:extLst>
+          </p:cNvPr>
+          <p:cNvSpPr/>
+          <p:nvPr/>
+        </p:nvSpPr>
+        <p:spPr>
+          <a:xfrm>
+            <a:off x="6691463" y="5379728"/>
+            <a:ext cx="63795" cy="56707"/>
+          </a:xfrm>
+          <a:prstGeom prst="ellipse">
+            <a:avLst/>
+          </a:prstGeom>
+        </p:spPr>
+        <p:style>
+          <a:lnRef idx="2">
+            <a:schemeClr val="accent1">
+              <a:shade val="50000"/>
+            </a:schemeClr>
+          </a:lnRef>
+          <a:fillRef idx="1">
+            <a:schemeClr val="accent1"/>
+          </a:fillRef>
+          <a:effectRef idx="0">
+            <a:schemeClr val="accent1"/>
+          </a:effectRef>
+          <a:fontRef idx="minor">
+            <a:schemeClr val="lt1"/>
+          </a:fontRef>
+        </p:style>
+        <p:txBody>
+          <a:bodyPr rtlCol="0" anchor="ctr"/>
+          <a:lstStyle/>
+          <a:p>
+            <a:pPr algn="ctr"/>
+            <a:endParaRPr lang="en-GB"/>
+          </a:p>
+        </p:txBody>
+      </p:sp>
+      <p:sp>
+        <p:nvSpPr>
+          <p:cNvPr id="94" name="Oval 93">
+            <a:extLst>
+              <a:ext uri="{FF2B5EF4-FFF2-40B4-BE49-F238E27FC236}">
+                <a16:creationId xmlns:a16="http://schemas.microsoft.com/office/drawing/2014/main" id="{BFEF9A68-2331-4856-9C51-C4FFC7D48129}"/>
+              </a:ext>
+            </a:extLst>
+          </p:cNvPr>
+          <p:cNvSpPr/>
+          <p:nvPr/>
+        </p:nvSpPr>
+        <p:spPr>
+          <a:xfrm>
+            <a:off x="6875874" y="5315932"/>
+            <a:ext cx="63795" cy="56707"/>
+          </a:xfrm>
+          <a:prstGeom prst="ellipse">
+            <a:avLst/>
+          </a:prstGeom>
+        </p:spPr>
+        <p:style>
+          <a:lnRef idx="2">
+            <a:schemeClr val="accent1">
+              <a:shade val="50000"/>
+            </a:schemeClr>
+          </a:lnRef>
+          <a:fillRef idx="1">
+            <a:schemeClr val="accent1"/>
+          </a:fillRef>
+          <a:effectRef idx="0">
+            <a:schemeClr val="accent1"/>
+          </a:effectRef>
+          <a:fontRef idx="minor">
+            <a:schemeClr val="lt1"/>
+          </a:fontRef>
+        </p:style>
+        <p:txBody>
+          <a:bodyPr rtlCol="0" anchor="ctr"/>
+          <a:lstStyle/>
+          <a:p>
+            <a:pPr algn="ctr"/>
+            <a:endParaRPr lang="en-GB"/>
+          </a:p>
+        </p:txBody>
+      </p:sp>
+      <p:sp>
+        <p:nvSpPr>
+          <p:cNvPr id="95" name="Oval 94">
+            <a:extLst>
+              <a:ext uri="{FF2B5EF4-FFF2-40B4-BE49-F238E27FC236}">
+                <a16:creationId xmlns:a16="http://schemas.microsoft.com/office/drawing/2014/main" id="{4CE32047-6324-91D5-4A27-F13A3B7DAC13}"/>
+              </a:ext>
+            </a:extLst>
+          </p:cNvPr>
+          <p:cNvSpPr/>
+          <p:nvPr/>
+        </p:nvSpPr>
+        <p:spPr>
+          <a:xfrm>
+            <a:off x="6493279" y="5553740"/>
+            <a:ext cx="63795" cy="56707"/>
+          </a:xfrm>
+          <a:prstGeom prst="ellipse">
+            <a:avLst/>
+          </a:prstGeom>
+        </p:spPr>
+        <p:style>
+          <a:lnRef idx="2">
+            <a:schemeClr val="accent1">
+              <a:shade val="50000"/>
+            </a:schemeClr>
+          </a:lnRef>
+          <a:fillRef idx="1">
+            <a:schemeClr val="accent1"/>
+          </a:fillRef>
+          <a:effectRef idx="0">
+            <a:schemeClr val="accent1"/>
+          </a:effectRef>
+          <a:fontRef idx="minor">
+            <a:schemeClr val="lt1"/>
+          </a:fontRef>
+        </p:style>
+        <p:txBody>
+          <a:bodyPr rtlCol="0" anchor="ctr"/>
+          <a:lstStyle/>
+          <a:p>
+            <a:pPr algn="ctr"/>
+            <a:endParaRPr lang="en-GB"/>
+          </a:p>
+        </p:txBody>
+      </p:sp>
+      <p:sp>
+        <p:nvSpPr>
+          <p:cNvPr id="96" name="Oval 95">
+            <a:extLst>
+              <a:ext uri="{FF2B5EF4-FFF2-40B4-BE49-F238E27FC236}">
+                <a16:creationId xmlns:a16="http://schemas.microsoft.com/office/drawing/2014/main" id="{E0B11135-9E1B-0CF7-652C-13BF115A8FCB}"/>
+              </a:ext>
+            </a:extLst>
+          </p:cNvPr>
+          <p:cNvSpPr/>
+          <p:nvPr/>
+        </p:nvSpPr>
+        <p:spPr>
+          <a:xfrm>
+            <a:off x="6539303" y="5253827"/>
+            <a:ext cx="63795" cy="56707"/>
+          </a:xfrm>
+          <a:prstGeom prst="ellipse">
+            <a:avLst/>
+          </a:prstGeom>
+        </p:spPr>
+        <p:style>
+          <a:lnRef idx="2">
+            <a:schemeClr val="accent1">
+              <a:shade val="50000"/>
+            </a:schemeClr>
+          </a:lnRef>
+          <a:fillRef idx="1">
+            <a:schemeClr val="accent1"/>
+          </a:fillRef>
+          <a:effectRef idx="0">
+            <a:schemeClr val="accent1"/>
+          </a:effectRef>
+          <a:fontRef idx="minor">
+            <a:schemeClr val="lt1"/>
+          </a:fontRef>
+        </p:style>
+        <p:txBody>
+          <a:bodyPr rtlCol="0" anchor="ctr"/>
+          <a:lstStyle/>
+          <a:p>
+            <a:pPr algn="ctr"/>
+            <a:endParaRPr lang="en-GB"/>
+          </a:p>
+        </p:txBody>
+      </p:sp>
+      <p:pic>
+        <p:nvPicPr>
+          <p:cNvPr id="101" name="Graphic 100">
+            <a:extLst>
+              <a:ext uri="{FF2B5EF4-FFF2-40B4-BE49-F238E27FC236}">
+                <a16:creationId xmlns:a16="http://schemas.microsoft.com/office/drawing/2014/main" id="{49D7FD0B-17DB-9E98-715B-C7C2E44207B7}"/>
+              </a:ext>
+            </a:extLst>
+          </p:cNvPr>
+          <p:cNvPicPr>
+            <a:picLocks noChangeAspect="1"/>
+          </p:cNvPicPr>
+          <p:nvPr/>
+        </p:nvPicPr>
+        <p:blipFill>
+          <a:blip r:embed="rId7">
+            <a:extLst>
+              <a:ext uri="{96DAC541-7B7A-43D3-8B79-37D633B846F1}">
+                <asvg:svgBlip xmlns:asvg="http://schemas.microsoft.com/office/drawing/2016/SVG/main" r:embed="rId8"/>
+              </a:ext>
+            </a:extLst>
+          </a:blip>
+          <a:stretch>
+            <a:fillRect/>
+          </a:stretch>
+        </p:blipFill>
+        <p:spPr>
+          <a:xfrm>
+            <a:off x="5032787" y="5459347"/>
+            <a:ext cx="122746" cy="122746"/>
+          </a:xfrm>
+          <a:prstGeom prst="rect">
+            <a:avLst/>
+          </a:prstGeom>
+        </p:spPr>
+      </p:pic>
+      <p:pic>
+        <p:nvPicPr>
+          <p:cNvPr id="102" name="Graphic 101">
+            <a:extLst>
+              <a:ext uri="{FF2B5EF4-FFF2-40B4-BE49-F238E27FC236}">
+                <a16:creationId xmlns:a16="http://schemas.microsoft.com/office/drawing/2014/main" id="{775F18D9-995A-5B16-2E17-CAEEA4784834}"/>
+              </a:ext>
+            </a:extLst>
+          </p:cNvPr>
+          <p:cNvPicPr>
+            <a:picLocks noChangeAspect="1"/>
+          </p:cNvPicPr>
+          <p:nvPr/>
+        </p:nvPicPr>
+        <p:blipFill>
+          <a:blip r:embed="rId7">
+            <a:extLst>
+              <a:ext uri="{96DAC541-7B7A-43D3-8B79-37D633B846F1}">
+                <asvg:svgBlip xmlns:asvg="http://schemas.microsoft.com/office/drawing/2016/SVG/main" r:embed="rId8"/>
+              </a:ext>
+            </a:extLst>
+          </a:blip>
+          <a:stretch>
+            <a:fillRect/>
+          </a:stretch>
+        </p:blipFill>
+        <p:spPr>
+          <a:xfrm>
+            <a:off x="5696921" y="4854232"/>
+            <a:ext cx="122746" cy="122746"/>
+          </a:xfrm>
+          <a:prstGeom prst="rect">
+            <a:avLst/>
+          </a:prstGeom>
+        </p:spPr>
+      </p:pic>
+      <p:pic>
+        <p:nvPicPr>
+          <p:cNvPr id="103" name="Graphic 102">
+            <a:extLst>
+              <a:ext uri="{FF2B5EF4-FFF2-40B4-BE49-F238E27FC236}">
+                <a16:creationId xmlns:a16="http://schemas.microsoft.com/office/drawing/2014/main" id="{6E796C22-4B88-B79E-4BAD-4B68F06AD4A6}"/>
+              </a:ext>
+            </a:extLst>
+          </p:cNvPr>
+          <p:cNvPicPr>
+            <a:picLocks noChangeAspect="1"/>
+          </p:cNvPicPr>
+          <p:nvPr/>
+        </p:nvPicPr>
+        <p:blipFill>
+          <a:blip r:embed="rId7">
+            <a:extLst>
+              <a:ext uri="{96DAC541-7B7A-43D3-8B79-37D633B846F1}">
+                <asvg:svgBlip xmlns:asvg="http://schemas.microsoft.com/office/drawing/2016/SVG/main" r:embed="rId8"/>
+              </a:ext>
+            </a:extLst>
+          </a:blip>
+          <a:stretch>
+            <a:fillRect/>
+          </a:stretch>
+        </p:blipFill>
+        <p:spPr>
+          <a:xfrm>
+            <a:off x="6667292" y="5427448"/>
+            <a:ext cx="122746" cy="122746"/>
+          </a:xfrm>
+          <a:prstGeom prst="rect">
+            <a:avLst/>
+          </a:prstGeom>
+        </p:spPr>
+      </p:pic>
+    </p:spTree>
+    <p:extLst>
+      <p:ext uri="{BB962C8B-B14F-4D97-AF65-F5344CB8AC3E}">
+        <p14:creationId xmlns:p14="http://schemas.microsoft.com/office/powerpoint/2010/main" val="243418805"/>
       </p:ext>
     </p:extLst>
   </p:cSld>

</xml_diff>